<commit_message>
App is a collection slide
</commit_message>
<xml_diff>
--- a/ThinkingInEvents-UserGroupTalk.pptx
+++ b/ThinkingInEvents-UserGroupTalk.pptx
@@ -5,7 +5,7 @@
     <p:sldMasterId id="2147483822" r:id="rId1"/>
   </p:sldMasterIdLst>
   <p:notesMasterIdLst>
-    <p:notesMasterId r:id="rId28"/>
+    <p:notesMasterId r:id="rId29"/>
   </p:notesMasterIdLst>
   <p:sldIdLst>
     <p:sldId id="256" r:id="rId2"/>
@@ -13,27 +13,28 @@
     <p:sldId id="563" r:id="rId4"/>
     <p:sldId id="571" r:id="rId5"/>
     <p:sldId id="407" r:id="rId6"/>
-    <p:sldId id="564" r:id="rId7"/>
-    <p:sldId id="534" r:id="rId8"/>
-    <p:sldId id="535" r:id="rId9"/>
-    <p:sldId id="550" r:id="rId10"/>
-    <p:sldId id="551" r:id="rId11"/>
-    <p:sldId id="552" r:id="rId12"/>
-    <p:sldId id="565" r:id="rId13"/>
-    <p:sldId id="566" r:id="rId14"/>
-    <p:sldId id="567" r:id="rId15"/>
-    <p:sldId id="568" r:id="rId16"/>
-    <p:sldId id="575" r:id="rId17"/>
-    <p:sldId id="569" r:id="rId18"/>
-    <p:sldId id="570" r:id="rId19"/>
-    <p:sldId id="408" r:id="rId20"/>
-    <p:sldId id="516" r:id="rId21"/>
-    <p:sldId id="576" r:id="rId22"/>
-    <p:sldId id="549" r:id="rId23"/>
-    <p:sldId id="574" r:id="rId24"/>
-    <p:sldId id="572" r:id="rId25"/>
-    <p:sldId id="573" r:id="rId26"/>
-    <p:sldId id="548" r:id="rId27"/>
+    <p:sldId id="577" r:id="rId7"/>
+    <p:sldId id="564" r:id="rId8"/>
+    <p:sldId id="534" r:id="rId9"/>
+    <p:sldId id="535" r:id="rId10"/>
+    <p:sldId id="550" r:id="rId11"/>
+    <p:sldId id="551" r:id="rId12"/>
+    <p:sldId id="552" r:id="rId13"/>
+    <p:sldId id="565" r:id="rId14"/>
+    <p:sldId id="566" r:id="rId15"/>
+    <p:sldId id="567" r:id="rId16"/>
+    <p:sldId id="568" r:id="rId17"/>
+    <p:sldId id="575" r:id="rId18"/>
+    <p:sldId id="569" r:id="rId19"/>
+    <p:sldId id="570" r:id="rId20"/>
+    <p:sldId id="408" r:id="rId21"/>
+    <p:sldId id="516" r:id="rId22"/>
+    <p:sldId id="576" r:id="rId23"/>
+    <p:sldId id="549" r:id="rId24"/>
+    <p:sldId id="574" r:id="rId25"/>
+    <p:sldId id="572" r:id="rId26"/>
+    <p:sldId id="573" r:id="rId27"/>
+    <p:sldId id="548" r:id="rId28"/>
   </p:sldIdLst>
   <p:sldSz cx="12192000" cy="6858000"/>
   <p:notesSz cx="6858000" cy="9144000"/>
@@ -222,7 +223,7 @@
           <a:p>
             <a:fld id="{D8D04E9A-002C-48D9-9B8C-2D672EB0EF8E}" type="datetimeFigureOut">
               <a:rPr lang="en-US" smtClean="0"/>
-              <a:t>8/25/2015</a:t>
+              <a:t>10/10/2015</a:t>
             </a:fld>
             <a:endParaRPr lang="en-US"/>
           </a:p>
@@ -643,7 +644,7 @@
           <a:p>
             <a:fld id="{1C4B0D22-0794-4A46-9999-BF90B47B1EAE}" type="slidenum">
               <a:rPr lang="en-US" smtClean="0"/>
-              <a:t>19</a:t>
+              <a:t>20</a:t>
             </a:fld>
             <a:endParaRPr lang="en-US"/>
           </a:p>
@@ -731,7 +732,7 @@
           <a:p>
             <a:fld id="{1C4B0D22-0794-4A46-9999-BF90B47B1EAE}" type="slidenum">
               <a:rPr lang="en-US" smtClean="0"/>
-              <a:t>20</a:t>
+              <a:t>21</a:t>
             </a:fld>
             <a:endParaRPr lang="en-US"/>
           </a:p>
@@ -976,7 +977,7 @@
           <a:p>
             <a:fld id="{96DFF08F-DC6B-4601-B491-B0F83F6DD2DA}" type="datetimeFigureOut">
               <a:rPr lang="en-US" smtClean="0"/>
-              <a:t>8/25/2015</a:t>
+              <a:t>10/10/2015</a:t>
             </a:fld>
             <a:endParaRPr lang="en-US" dirty="0"/>
           </a:p>
@@ -1184,7 +1185,7 @@
           <a:p>
             <a:fld id="{96DFF08F-DC6B-4601-B491-B0F83F6DD2DA}" type="datetimeFigureOut">
               <a:rPr lang="en-US" smtClean="0"/>
-              <a:t>8/25/2015</a:t>
+              <a:t>10/10/2015</a:t>
             </a:fld>
             <a:endParaRPr lang="en-US" dirty="0"/>
           </a:p>
@@ -1440,7 +1441,7 @@
           <a:p>
             <a:fld id="{96DFF08F-DC6B-4601-B491-B0F83F6DD2DA}" type="datetimeFigureOut">
               <a:rPr lang="en-US" smtClean="0"/>
-              <a:t>8/25/2015</a:t>
+              <a:t>10/10/2015</a:t>
             </a:fld>
             <a:endParaRPr lang="en-US" dirty="0"/>
           </a:p>
@@ -1799,7 +1800,7 @@
           <a:p>
             <a:fld id="{D62CEF3B-A037-46D0-B02C-1428F07E9383}" type="datetimeFigureOut">
               <a:rPr lang="en-US" smtClean="0"/>
-              <a:t>8/25/2015</a:t>
+              <a:t>10/10/2015</a:t>
             </a:fld>
             <a:endParaRPr lang="en-US" dirty="0"/>
           </a:p>
@@ -2142,7 +2143,7 @@
           <a:p>
             <a:fld id="{96DFF08F-DC6B-4601-B491-B0F83F6DD2DA}" type="datetimeFigureOut">
               <a:rPr lang="en-US" smtClean="0"/>
-              <a:t>8/25/2015</a:t>
+              <a:t>10/10/2015</a:t>
             </a:fld>
             <a:endParaRPr lang="en-US" dirty="0"/>
           </a:p>
@@ -2417,7 +2418,7 @@
           <a:p>
             <a:fld id="{96DFF08F-DC6B-4601-B491-B0F83F6DD2DA}" type="datetimeFigureOut">
               <a:rPr lang="en-US" smtClean="0"/>
-              <a:t>8/25/2015</a:t>
+              <a:t>10/10/2015</a:t>
             </a:fld>
             <a:endParaRPr lang="en-US" dirty="0"/>
           </a:p>
@@ -2796,7 +2797,7 @@
           <a:p>
             <a:fld id="{96DFF08F-DC6B-4601-B491-B0F83F6DD2DA}" type="datetimeFigureOut">
               <a:rPr lang="en-US" smtClean="0"/>
-              <a:t>8/25/2015</a:t>
+              <a:t>10/10/2015</a:t>
             </a:fld>
             <a:endParaRPr lang="en-US" dirty="0"/>
           </a:p>
@@ -2914,7 +2915,7 @@
           <a:p>
             <a:fld id="{96DFF08F-DC6B-4601-B491-B0F83F6DD2DA}" type="datetimeFigureOut">
               <a:rPr lang="en-US" smtClean="0"/>
-              <a:t>8/25/2015</a:t>
+              <a:t>10/10/2015</a:t>
             </a:fld>
             <a:endParaRPr lang="en-US" dirty="0"/>
           </a:p>
@@ -3086,7 +3087,7 @@
             <a:fld id="{96DFF08F-DC6B-4601-B491-B0F83F6DD2DA}" type="datetimeFigureOut">
               <a:rPr lang="en-US" smtClean="0"/>
               <a:pPr/>
-              <a:t>8/25/2015</a:t>
+              <a:t>10/10/2015</a:t>
             </a:fld>
             <a:endParaRPr lang="en-US" dirty="0"/>
           </a:p>
@@ -3442,7 +3443,7 @@
             <a:fld id="{96DFF08F-DC6B-4601-B491-B0F83F6DD2DA}" type="datetimeFigureOut">
               <a:rPr lang="en-US" smtClean="0"/>
               <a:pPr/>
-              <a:t>8/25/2015</a:t>
+              <a:t>10/10/2015</a:t>
             </a:fld>
             <a:endParaRPr lang="en-US" dirty="0"/>
           </a:p>
@@ -3820,7 +3821,7 @@
           <a:p>
             <a:fld id="{96DFF08F-DC6B-4601-B491-B0F83F6DD2DA}" type="datetimeFigureOut">
               <a:rPr lang="en-US" smtClean="0"/>
-              <a:t>8/25/2015</a:t>
+              <a:t>10/10/2015</a:t>
             </a:fld>
             <a:endParaRPr lang="en-US" dirty="0"/>
           </a:p>
@@ -4108,7 +4109,7 @@
             <a:fld id="{96DFF08F-DC6B-4601-B491-B0F83F6DD2DA}" type="datetimeFigureOut">
               <a:rPr lang="en-US" smtClean="0"/>
               <a:pPr/>
-              <a:t>8/25/2015</a:t>
+              <a:t>10/10/2015</a:t>
             </a:fld>
             <a:endParaRPr lang="en-US" dirty="0"/>
           </a:p>
@@ -4772,6 +4773,98 @@
             </a:r>
             <a:r>
               <a:rPr lang="en-US" i="1" smtClean="0"/>
+              <a:t>event</a:t>
+            </a:r>
+            <a:r>
+              <a:rPr lang="en-US" smtClean="0"/>
+              <a:t> is a member</a:t>
+            </a:r>
+            <a:endParaRPr lang="en-US"/>
+          </a:p>
+        </p:txBody>
+      </p:sp>
+      <p:pic>
+        <p:nvPicPr>
+          <p:cNvPr id="6" name="Picture 5"/>
+          <p:cNvPicPr>
+            <a:picLocks noChangeAspect="1"/>
+          </p:cNvPicPr>
+          <p:nvPr/>
+        </p:nvPicPr>
+        <p:blipFill>
+          <a:blip r:embed="rId2"/>
+          <a:stretch>
+            <a:fillRect/>
+          </a:stretch>
+        </p:blipFill>
+        <p:spPr>
+          <a:xfrm>
+            <a:off x="1097279" y="1889871"/>
+            <a:ext cx="8129847" cy="4392429"/>
+          </a:xfrm>
+          <a:prstGeom prst="rect">
+            <a:avLst/>
+          </a:prstGeom>
+        </p:spPr>
+      </p:pic>
+    </p:spTree>
+    <p:extLst>
+      <p:ext uri="{BB962C8B-B14F-4D97-AF65-F5344CB8AC3E}">
+        <p14:creationId xmlns:p14="http://schemas.microsoft.com/office/powerpoint/2010/main" val="3836253029"/>
+      </p:ext>
+    </p:extLst>
+  </p:cSld>
+  <p:clrMapOvr>
+    <a:masterClrMapping/>
+  </p:clrMapOvr>
+  <p:timing>
+    <p:tnLst>
+      <p:par>
+        <p:cTn id="1" dur="indefinite" restart="never" nodeType="tmRoot"/>
+      </p:par>
+    </p:tnLst>
+  </p:timing>
+</p:sld>
+</file>
+
+<file path=ppt/slides/slide11.xml><?xml version="1.0" encoding="utf-8"?>
+<p:sld xmlns:a="http://schemas.openxmlformats.org/drawingml/2006/main" xmlns:r="http://schemas.openxmlformats.org/officeDocument/2006/relationships" xmlns:p="http://schemas.openxmlformats.org/presentationml/2006/main">
+  <p:cSld>
+    <p:spTree>
+      <p:nvGrpSpPr>
+        <p:cNvPr id="1" name=""/>
+        <p:cNvGrpSpPr/>
+        <p:nvPr/>
+      </p:nvGrpSpPr>
+      <p:grpSpPr>
+        <a:xfrm>
+          <a:off x="0" y="0"/>
+          <a:ext cx="0" cy="0"/>
+          <a:chOff x="0" y="0"/>
+          <a:chExt cx="0" cy="0"/>
+        </a:xfrm>
+      </p:grpSpPr>
+      <p:sp>
+        <p:nvSpPr>
+          <p:cNvPr id="2" name="Title 1"/>
+          <p:cNvSpPr>
+            <a:spLocks noGrp="1"/>
+          </p:cNvSpPr>
+          <p:nvPr>
+            <p:ph type="title"/>
+          </p:nvPr>
+        </p:nvSpPr>
+        <p:spPr/>
+        <p:txBody>
+          <a:bodyPr/>
+          <a:lstStyle/>
+          <a:p>
+            <a:r>
+              <a:rPr lang="en-US" smtClean="0"/>
+              <a:t>An </a:t>
+            </a:r>
+            <a:r>
+              <a:rPr lang="en-US" i="1" smtClean="0"/>
               <a:t>event handler...</a:t>
             </a:r>
             <a:endParaRPr lang="en-US"/>
@@ -5031,7 +5124,7 @@
 </p:sld>
 </file>
 
-<file path=ppt/slides/slide11.xml><?xml version="1.0" encoding="utf-8"?>
+<file path=ppt/slides/slide12.xml><?xml version="1.0" encoding="utf-8"?>
 <p:sld xmlns:a="http://schemas.openxmlformats.org/drawingml/2006/main" xmlns:r="http://schemas.openxmlformats.org/officeDocument/2006/relationships" xmlns:p="http://schemas.openxmlformats.org/presentationml/2006/main">
   <p:cSld>
     <p:spTree>
@@ -5437,7 +5530,7 @@
 </p:sld>
 </file>
 
-<file path=ppt/slides/slide12.xml><?xml version="1.0" encoding="utf-8"?>
+<file path=ppt/slides/slide13.xml><?xml version="1.0" encoding="utf-8"?>
 <p:sld xmlns:a="http://schemas.openxmlformats.org/drawingml/2006/main" xmlns:r="http://schemas.openxmlformats.org/officeDocument/2006/relationships" xmlns:p="http://schemas.openxmlformats.org/presentationml/2006/main">
   <p:cSld>
     <p:spTree>
@@ -5828,140 +5921,6 @@
 </p:sld>
 </file>
 
-<file path=ppt/slides/slide13.xml><?xml version="1.0" encoding="utf-8"?>
-<p:sld xmlns:a="http://schemas.openxmlformats.org/drawingml/2006/main" xmlns:r="http://schemas.openxmlformats.org/officeDocument/2006/relationships" xmlns:p="http://schemas.openxmlformats.org/presentationml/2006/main">
-  <p:cSld>
-    <p:spTree>
-      <p:nvGrpSpPr>
-        <p:cNvPr id="1" name=""/>
-        <p:cNvGrpSpPr/>
-        <p:nvPr/>
-      </p:nvGrpSpPr>
-      <p:grpSpPr>
-        <a:xfrm>
-          <a:off x="0" y="0"/>
-          <a:ext cx="0" cy="0"/>
-          <a:chOff x="0" y="0"/>
-          <a:chExt cx="0" cy="0"/>
-        </a:xfrm>
-      </p:grpSpPr>
-      <p:sp>
-        <p:nvSpPr>
-          <p:cNvPr id="2" name="Title 1"/>
-          <p:cNvSpPr>
-            <a:spLocks noGrp="1"/>
-          </p:cNvSpPr>
-          <p:nvPr>
-            <p:ph type="title"/>
-          </p:nvPr>
-        </p:nvSpPr>
-        <p:spPr/>
-        <p:txBody>
-          <a:bodyPr/>
-          <a:lstStyle/>
-          <a:p>
-            <a:r>
-              <a:rPr lang="en-US" smtClean="0"/>
-              <a:t>Terminating / Non-Terminating Errors</a:t>
-            </a:r>
-            <a:endParaRPr lang="en-US"/>
-          </a:p>
-        </p:txBody>
-      </p:sp>
-      <p:sp>
-        <p:nvSpPr>
-          <p:cNvPr id="4" name="Content Placeholder 2"/>
-          <p:cNvSpPr>
-            <a:spLocks noGrp="1"/>
-          </p:cNvSpPr>
-          <p:nvPr>
-            <p:ph idx="1"/>
-          </p:nvPr>
-        </p:nvSpPr>
-        <p:spPr/>
-        <p:txBody>
-          <a:bodyPr>
-            <a:normAutofit/>
-          </a:bodyPr>
-          <a:lstStyle/>
-          <a:p>
-            <a:pPr lvl="1">
-              <a:buFont typeface="Arial" panose="020B0604020202020204" pitchFamily="34" charset="0"/>
-              <a:buChar char="•"/>
-            </a:pPr>
-            <a:r>
-              <a:rPr lang="en-US" sz="3200" smtClean="0">
-                <a:solidFill>
-                  <a:srgbClr val="0070C0"/>
-                </a:solidFill>
-              </a:rPr>
-              <a:t>Non-Terminating Errors </a:t>
-            </a:r>
-            <a:r>
-              <a:rPr lang="en-US" sz="3200" smtClean="0">
-                <a:solidFill>
-                  <a:schemeClr val="tx1"/>
-                </a:solidFill>
-              </a:rPr>
-              <a:t>:  Less serious errors. By default, write an error and continue.</a:t>
-            </a:r>
-          </a:p>
-          <a:p>
-            <a:endParaRPr lang="en-US" sz="3200" smtClean="0">
-              <a:solidFill>
-                <a:srgbClr val="0070C0"/>
-              </a:solidFill>
-            </a:endParaRPr>
-          </a:p>
-          <a:p>
-            <a:pPr lvl="1">
-              <a:buFont typeface="Arial" panose="020B0604020202020204" pitchFamily="34" charset="0"/>
-              <a:buChar char="•"/>
-            </a:pPr>
-            <a:r>
-              <a:rPr lang="en-US" sz="3200" smtClean="0">
-                <a:solidFill>
-                  <a:srgbClr val="0070C0"/>
-                </a:solidFill>
-              </a:rPr>
-              <a:t>Terminating Errors : </a:t>
-            </a:r>
-            <a:r>
-              <a:rPr lang="en-US" sz="3200" smtClean="0">
-                <a:solidFill>
-                  <a:schemeClr val="tx1"/>
-                </a:solidFill>
-              </a:rPr>
-              <a:t>Serious errors. By default, write and error and stop the pipeline.</a:t>
-            </a:r>
-            <a:endParaRPr lang="en-US" sz="3200">
-              <a:solidFill>
-                <a:schemeClr val="tx1"/>
-              </a:solidFill>
-            </a:endParaRPr>
-          </a:p>
-        </p:txBody>
-      </p:sp>
-    </p:spTree>
-    <p:extLst>
-      <p:ext uri="{BB962C8B-B14F-4D97-AF65-F5344CB8AC3E}">
-        <p14:creationId xmlns:p14="http://schemas.microsoft.com/office/powerpoint/2010/main" val="2175067507"/>
-      </p:ext>
-    </p:extLst>
-  </p:cSld>
-  <p:clrMapOvr>
-    <a:masterClrMapping/>
-  </p:clrMapOvr>
-  <p:timing>
-    <p:tnLst>
-      <p:par>
-        <p:cTn id="1" dur="indefinite" restart="never" nodeType="tmRoot"/>
-      </p:par>
-    </p:tnLst>
-  </p:timing>
-</p:sld>
-</file>
-
 <file path=ppt/slides/slide14.xml><?xml version="1.0" encoding="utf-8"?>
 <p:sld xmlns:a="http://schemas.openxmlformats.org/drawingml/2006/main" xmlns:r="http://schemas.openxmlformats.org/officeDocument/2006/relationships" xmlns:p="http://schemas.openxmlformats.org/presentationml/2006/main">
   <p:cSld>
@@ -6012,12 +5971,7 @@
             <p:ph idx="1"/>
           </p:nvPr>
         </p:nvSpPr>
-        <p:spPr>
-          <a:xfrm>
-            <a:off x="379525" y="1872995"/>
-            <a:ext cx="11183210" cy="4023360"/>
-          </a:xfrm>
-        </p:spPr>
+        <p:spPr/>
         <p:txBody>
           <a:bodyPr>
             <a:normAutofit/>
@@ -6029,7 +5983,7 @@
               <a:buChar char="•"/>
             </a:pPr>
             <a:r>
-              <a:rPr lang="en-US" sz="3200" dirty="0" smtClean="0">
+              <a:rPr lang="en-US" sz="3200" smtClean="0">
                 <a:solidFill>
                   <a:srgbClr val="0070C0"/>
                 </a:solidFill>
@@ -6037,110 +5991,16 @@
               <a:t>Non-Terminating Errors </a:t>
             </a:r>
             <a:r>
-              <a:rPr lang="en-US" sz="3200" dirty="0" smtClean="0">
+              <a:rPr lang="en-US" sz="3200" smtClean="0">
                 <a:solidFill>
                   <a:schemeClr val="tx1"/>
                 </a:solidFill>
               </a:rPr>
-              <a:t>:  </a:t>
-            </a:r>
-          </a:p>
-          <a:p>
-            <a:pPr marL="201168" lvl="1" indent="0">
-              <a:buNone/>
-            </a:pPr>
-            <a:r>
-              <a:rPr lang="en-US" sz="2800" dirty="0">
-                <a:solidFill>
-                  <a:schemeClr val="tx1"/>
-                </a:solidFill>
-              </a:rPr>
-              <a:t>	</a:t>
-            </a:r>
-            <a:r>
-              <a:rPr lang="en-US" sz="3200" dirty="0" smtClean="0">
-                <a:solidFill>
-                  <a:schemeClr val="tx1"/>
-                </a:solidFill>
-              </a:rPr>
-              <a:t>if (-not (Get-Service -</a:t>
-            </a:r>
-            <a:r>
-              <a:rPr lang="en-US" sz="3200" dirty="0" smtClean="0">
-                <a:solidFill>
-                  <a:schemeClr val="accent2"/>
-                </a:solidFill>
-              </a:rPr>
-              <a:t>ServiceName</a:t>
-            </a:r>
-            <a:r>
-              <a:rPr lang="en-US" sz="3200" dirty="0" smtClean="0">
-                <a:solidFill>
-                  <a:schemeClr val="tx1"/>
-                </a:solidFill>
-              </a:rPr>
-              <a:t> foo `</a:t>
-            </a:r>
-          </a:p>
-          <a:p>
-            <a:pPr marL="201168" lvl="1" indent="0">
-              <a:buNone/>
-            </a:pPr>
-            <a:r>
-              <a:rPr lang="en-US" sz="3200" dirty="0">
-                <a:solidFill>
-                  <a:schemeClr val="tx1"/>
-                </a:solidFill>
-              </a:rPr>
-              <a:t>	</a:t>
-            </a:r>
-            <a:r>
-              <a:rPr lang="en-US" sz="3200" dirty="0" smtClean="0">
-                <a:solidFill>
-                  <a:schemeClr val="tx1"/>
-                </a:solidFill>
-              </a:rPr>
-              <a:t>	</a:t>
-            </a:r>
-            <a:r>
-              <a:rPr lang="en-US" sz="3200" dirty="0" smtClean="0">
-                <a:solidFill>
-                  <a:srgbClr val="FF0000"/>
-                </a:solidFill>
-              </a:rPr>
-              <a:t>–ErrorAction SilentlyContinue</a:t>
-            </a:r>
-            <a:r>
-              <a:rPr lang="en-US" sz="3200" dirty="0" smtClean="0">
-                <a:solidFill>
-                  <a:schemeClr val="tx1"/>
-                </a:solidFill>
-              </a:rPr>
-              <a:t>))</a:t>
-            </a:r>
-            <a:br>
-              <a:rPr lang="en-US" sz="3200" dirty="0" smtClean="0">
-                <a:solidFill>
-                  <a:schemeClr val="tx1"/>
-                </a:solidFill>
-              </a:rPr>
-            </a:br>
-            <a:r>
-              <a:rPr lang="en-US" sz="3200" dirty="0" smtClean="0">
-                <a:solidFill>
-                  <a:schemeClr val="tx1"/>
-                </a:solidFill>
-              </a:rPr>
-              <a:t>         { &lt;Handle the error }</a:t>
-            </a:r>
-            <a:br>
-              <a:rPr lang="en-US" sz="3200" dirty="0" smtClean="0">
-                <a:solidFill>
-                  <a:schemeClr val="tx1"/>
-                </a:solidFill>
-              </a:rPr>
-            </a:br>
-            <a:endParaRPr lang="en-US" sz="3200" dirty="0">
+              <a:t>:  Less serious errors. By default, write an error and continue.</a:t>
+            </a:r>
+          </a:p>
+          <a:p>
+            <a:endParaRPr lang="en-US" sz="3200" smtClean="0">
               <a:solidFill>
                 <a:srgbClr val="0070C0"/>
               </a:solidFill>
@@ -6152,66 +6012,22 @@
               <a:buChar char="•"/>
             </a:pPr>
             <a:r>
-              <a:rPr lang="en-US" sz="3200" dirty="0" smtClean="0">
+              <a:rPr lang="en-US" sz="3200" smtClean="0">
                 <a:solidFill>
                   <a:srgbClr val="0070C0"/>
                 </a:solidFill>
               </a:rPr>
               <a:t>Terminating Errors : </a:t>
             </a:r>
-            <a:br>
-              <a:rPr lang="en-US" sz="3200" dirty="0" smtClean="0">
-                <a:solidFill>
-                  <a:srgbClr val="0070C0"/>
-                </a:solidFill>
-              </a:rPr>
-            </a:br>
-            <a:r>
-              <a:rPr lang="en-US" sz="3200" dirty="0">
+            <a:r>
+              <a:rPr lang="en-US" sz="3200" smtClean="0">
                 <a:solidFill>
                   <a:schemeClr val="tx1"/>
                 </a:solidFill>
               </a:rPr>
-              <a:t>	try { Get-Service -</a:t>
-            </a:r>
-            <a:r>
-              <a:rPr lang="en-US" sz="3200" dirty="0">
-                <a:solidFill>
-                  <a:schemeClr val="accent2"/>
-                </a:solidFill>
-              </a:rPr>
-              <a:t>ComputerName</a:t>
-            </a:r>
-            <a:r>
-              <a:rPr lang="en-US" sz="3200" dirty="0">
-                <a:solidFill>
-                  <a:schemeClr val="tx1"/>
-                </a:solidFill>
-              </a:rPr>
-              <a:t> foo }</a:t>
-            </a:r>
-            <a:br>
-              <a:rPr lang="en-US" sz="3200" dirty="0">
-                <a:solidFill>
-                  <a:schemeClr val="tx1"/>
-                </a:solidFill>
-              </a:rPr>
-            </a:br>
-            <a:r>
-              <a:rPr lang="en-US" sz="3200" dirty="0">
-                <a:solidFill>
-                  <a:schemeClr val="tx1"/>
-                </a:solidFill>
-              </a:rPr>
-              <a:t>	catch { &lt;Handle the error&gt;}</a:t>
-            </a:r>
-          </a:p>
-          <a:p>
-            <a:pPr lvl="1">
-              <a:buFont typeface="Arial" panose="020B0604020202020204" pitchFamily="34" charset="0"/>
-              <a:buChar char="•"/>
-            </a:pPr>
-            <a:endParaRPr lang="en-US" sz="3200" dirty="0">
+              <a:t>Serious errors. By default, write and error and stop the pipeline.</a:t>
+            </a:r>
+            <a:endParaRPr lang="en-US" sz="3200">
               <a:solidFill>
                 <a:schemeClr val="tx1"/>
               </a:solidFill>
@@ -6222,7 +6038,7 @@
     </p:spTree>
     <p:extLst>
       <p:ext uri="{BB962C8B-B14F-4D97-AF65-F5344CB8AC3E}">
-        <p14:creationId xmlns:p14="http://schemas.microsoft.com/office/powerpoint/2010/main" val="3385123494"/>
+        <p14:creationId xmlns:p14="http://schemas.microsoft.com/office/powerpoint/2010/main" val="2175067507"/>
       </p:ext>
     </p:extLst>
   </p:cSld>
@@ -6273,7 +6089,7 @@
           <a:p>
             <a:r>
               <a:rPr lang="en-US" smtClean="0"/>
-              <a:t>Make a non-terminating error terminate</a:t>
+              <a:t>Terminating / Non-Terminating Errors</a:t>
             </a:r>
             <a:endParaRPr lang="en-US"/>
           </a:p>
@@ -6291,8 +6107,8 @@
         </p:nvSpPr>
         <p:spPr>
           <a:xfrm>
-            <a:off x="1097280" y="1804169"/>
-            <a:ext cx="10058400" cy="4023360"/>
+            <a:off x="379525" y="1872995"/>
+            <a:ext cx="11183210" cy="4023360"/>
           </a:xfrm>
         </p:spPr>
         <p:txBody>
@@ -6327,12 +6143,73 @@
               <a:buNone/>
             </a:pPr>
             <a:r>
+              <a:rPr lang="en-US" sz="2800" dirty="0">
+                <a:solidFill>
+                  <a:schemeClr val="tx1"/>
+                </a:solidFill>
+              </a:rPr>
+              <a:t>	</a:t>
+            </a:r>
+            <a:r>
               <a:rPr lang="en-US" sz="3200" dirty="0" smtClean="0">
                 <a:solidFill>
                   <a:schemeClr val="tx1"/>
                 </a:solidFill>
               </a:rPr>
-              <a:t>	try {  Get-Service -ServiceName foo `</a:t>
+              <a:t>if (-not (Get-Service -</a:t>
+            </a:r>
+            <a:r>
+              <a:rPr lang="en-US" sz="3200" dirty="0" smtClean="0">
+                <a:solidFill>
+                  <a:schemeClr val="accent2"/>
+                </a:solidFill>
+              </a:rPr>
+              <a:t>ServiceName</a:t>
+            </a:r>
+            <a:r>
+              <a:rPr lang="en-US" sz="3200" dirty="0" smtClean="0">
+                <a:solidFill>
+                  <a:schemeClr val="tx1"/>
+                </a:solidFill>
+              </a:rPr>
+              <a:t> foo `</a:t>
+            </a:r>
+          </a:p>
+          <a:p>
+            <a:pPr marL="201168" lvl="1" indent="0">
+              <a:buNone/>
+            </a:pPr>
+            <a:r>
+              <a:rPr lang="en-US" sz="3200" dirty="0">
+                <a:solidFill>
+                  <a:schemeClr val="tx1"/>
+                </a:solidFill>
+              </a:rPr>
+              <a:t>	</a:t>
+            </a:r>
+            <a:r>
+              <a:rPr lang="en-US" sz="3200" dirty="0" smtClean="0">
+                <a:solidFill>
+                  <a:schemeClr val="tx1"/>
+                </a:solidFill>
+              </a:rPr>
+              <a:t>	</a:t>
+            </a:r>
+            <a:r>
+              <a:rPr lang="en-US" sz="3200" dirty="0" smtClean="0">
+                <a:solidFill>
+                  <a:srgbClr val="FF0000"/>
+                </a:solidFill>
+              </a:rPr>
+              <a:t>–ErrorAction SilentlyContinue</a:t>
+            </a:r>
+            <a:r>
+              <a:rPr lang="en-US" sz="3200" dirty="0" smtClean="0">
+                <a:solidFill>
+                  <a:schemeClr val="tx1"/>
+                </a:solidFill>
+              </a:rPr>
+              <a:t>))</a:t>
             </a:r>
             <a:br>
               <a:rPr lang="en-US" sz="3200" dirty="0" smtClean="0">
@@ -6347,23 +6224,7 @@
                   <a:schemeClr val="tx1"/>
                 </a:solidFill>
               </a:rPr>
-              <a:t>                  </a:t>
-            </a:r>
-            <a:r>
-              <a:rPr lang="en-US" sz="3200" dirty="0" smtClean="0">
-                <a:solidFill>
-                  <a:srgbClr val="FF0000"/>
-                </a:solidFill>
-              </a:rPr>
-              <a:t> -ErrorAction Stop</a:t>
-            </a:r>
-            <a:r>
-              <a:rPr lang="en-US" sz="3200" dirty="0" smtClean="0">
-                <a:solidFill>
-                  <a:schemeClr val="tx1"/>
-                </a:solidFill>
-              </a:rPr>
-              <a:t> }</a:t>
+              <a:t>         { &lt;Handle the error }</a:t>
             </a:r>
             <a:br>
               <a:rPr lang="en-US" sz="3200" dirty="0" smtClean="0">
@@ -6372,14 +6233,77 @@
                 </a:solidFill>
               </a:rPr>
             </a:br>
+            <a:endParaRPr lang="en-US" sz="3200" dirty="0">
+              <a:solidFill>
+                <a:srgbClr val="0070C0"/>
+              </a:solidFill>
+            </a:endParaRPr>
+          </a:p>
+          <a:p>
+            <a:pPr lvl="1">
+              <a:buFont typeface="Arial" panose="020B0604020202020204" pitchFamily="34" charset="0"/>
+              <a:buChar char="•"/>
+            </a:pPr>
             <a:r>
               <a:rPr lang="en-US" sz="3200" dirty="0" smtClean="0">
                 <a:solidFill>
+                  <a:srgbClr val="0070C0"/>
+                </a:solidFill>
+              </a:rPr>
+              <a:t>Terminating Errors : </a:t>
+            </a:r>
+            <a:br>
+              <a:rPr lang="en-US" sz="3200" dirty="0" smtClean="0">
+                <a:solidFill>
+                  <a:srgbClr val="0070C0"/>
+                </a:solidFill>
+              </a:rPr>
+            </a:br>
+            <a:r>
+              <a:rPr lang="en-US" sz="3200" dirty="0">
+                <a:solidFill>
                   <a:schemeClr val="tx1"/>
                 </a:solidFill>
               </a:rPr>
-              <a:t>        catch { &lt;Handle the error }</a:t>
-            </a:r>
+              <a:t>	try { Get-Service -</a:t>
+            </a:r>
+            <a:r>
+              <a:rPr lang="en-US" sz="3200" dirty="0">
+                <a:solidFill>
+                  <a:schemeClr val="accent2"/>
+                </a:solidFill>
+              </a:rPr>
+              <a:t>ComputerName</a:t>
+            </a:r>
+            <a:r>
+              <a:rPr lang="en-US" sz="3200" dirty="0">
+                <a:solidFill>
+                  <a:schemeClr val="tx1"/>
+                </a:solidFill>
+              </a:rPr>
+              <a:t> foo }</a:t>
+            </a:r>
+            <a:br>
+              <a:rPr lang="en-US" sz="3200" dirty="0">
+                <a:solidFill>
+                  <a:schemeClr val="tx1"/>
+                </a:solidFill>
+              </a:rPr>
+            </a:br>
+            <a:r>
+              <a:rPr lang="en-US" sz="3200" dirty="0">
+                <a:solidFill>
+                  <a:schemeClr val="tx1"/>
+                </a:solidFill>
+              </a:rPr>
+              <a:t>	catch { &lt;Handle the error&gt;}</a:t>
+            </a:r>
+          </a:p>
+          <a:p>
+            <a:pPr lvl="1">
+              <a:buFont typeface="Arial" panose="020B0604020202020204" pitchFamily="34" charset="0"/>
+              <a:buChar char="•"/>
+            </a:pPr>
             <a:endParaRPr lang="en-US" sz="3200" dirty="0">
               <a:solidFill>
                 <a:schemeClr val="tx1"/>
@@ -6391,7 +6315,7 @@
     </p:spTree>
     <p:extLst>
       <p:ext uri="{BB962C8B-B14F-4D97-AF65-F5344CB8AC3E}">
-        <p14:creationId xmlns:p14="http://schemas.microsoft.com/office/powerpoint/2010/main" val="992473636"/>
+        <p14:creationId xmlns:p14="http://schemas.microsoft.com/office/powerpoint/2010/main" val="3385123494"/>
       </p:ext>
     </p:extLst>
   </p:cSld>
@@ -6441,16 +6365,16 @@
           <a:lstStyle/>
           <a:p>
             <a:r>
-              <a:rPr lang="en-US" dirty="0" smtClean="0"/>
-              <a:t>Subexpression  $(…)</a:t>
-            </a:r>
-            <a:endParaRPr lang="en-US" dirty="0"/>
-          </a:p>
-        </p:txBody>
-      </p:sp>
-      <p:sp>
-        <p:nvSpPr>
-          <p:cNvPr id="3" name="Content Placeholder 2"/>
+              <a:rPr lang="en-US" smtClean="0"/>
+              <a:t>Make a non-terminating error terminate</a:t>
+            </a:r>
+            <a:endParaRPr lang="en-US"/>
+          </a:p>
+        </p:txBody>
+      </p:sp>
+      <p:sp>
+        <p:nvSpPr>
+          <p:cNvPr id="4" name="Content Placeholder 2"/>
           <p:cNvSpPr>
             <a:spLocks noGrp="1"/>
           </p:cNvSpPr>
@@ -6460,139 +6384,120 @@
         </p:nvSpPr>
         <p:spPr>
           <a:xfrm>
-            <a:off x="1097280" y="1845733"/>
-            <a:ext cx="10058400" cy="4427247"/>
+            <a:off x="1097280" y="1804169"/>
+            <a:ext cx="10058400" cy="4023360"/>
           </a:xfrm>
         </p:spPr>
         <p:txBody>
           <a:bodyPr>
-            <a:noAutofit/>
+            <a:normAutofit/>
           </a:bodyPr>
           <a:lstStyle/>
           <a:p>
-            <a:pPr>
+            <a:pPr lvl="1">
               <a:buFont typeface="Arial" panose="020B0604020202020204" pitchFamily="34" charset="0"/>
               <a:buChar char="•"/>
             </a:pPr>
             <a:r>
-              <a:rPr lang="en-US" sz="2800" dirty="0" smtClean="0"/>
-              <a:t> Evaluates the statements in parentheses</a:t>
-            </a:r>
-          </a:p>
-          <a:p>
-            <a:pPr>
-              <a:buFont typeface="Arial" panose="020B0604020202020204" pitchFamily="34" charset="0"/>
-              <a:buChar char="•"/>
-            </a:pPr>
-            <a:r>
-              <a:rPr lang="en-US" sz="2800" dirty="0" smtClean="0"/>
-              <a:t> Includes the output in the result.</a:t>
-            </a:r>
-          </a:p>
-          <a:p>
-            <a:pPr>
-              <a:buFont typeface="Arial" panose="020B0604020202020204" pitchFamily="34" charset="0"/>
-              <a:buChar char="•"/>
-            </a:pPr>
-            <a:r>
-              <a:rPr lang="en-US" sz="2800" dirty="0"/>
-              <a:t> </a:t>
-            </a:r>
-            <a:r>
-              <a:rPr lang="en-US" sz="2800" dirty="0" smtClean="0"/>
-              <a:t>Required for multiple statements and properties of an object.</a:t>
-            </a:r>
-          </a:p>
-          <a:p>
-            <a:pPr>
-              <a:buFont typeface="Arial" panose="020B0604020202020204" pitchFamily="34" charset="0"/>
-              <a:buChar char="•"/>
-            </a:pPr>
-            <a:r>
-              <a:rPr lang="en-US" sz="2800" dirty="0"/>
-              <a:t> </a:t>
-            </a:r>
-            <a:r>
-              <a:rPr lang="en-US" sz="2800" dirty="0" smtClean="0"/>
-              <a:t>Avoids intermediate variable</a:t>
-            </a:r>
-            <a:br>
-              <a:rPr lang="en-US" sz="2800" dirty="0" smtClean="0"/>
-            </a:br>
-            <a:endParaRPr lang="en-US" sz="2800" dirty="0" smtClean="0"/>
-          </a:p>
-          <a:p>
-            <a:pPr>
-              <a:buFont typeface="Arial" panose="020B0604020202020204" pitchFamily="34" charset="0"/>
-              <a:buChar char="•"/>
-            </a:pPr>
-            <a:r>
-              <a:rPr lang="en-US" sz="2800" dirty="0" smtClean="0">
-                <a:solidFill>
-                  <a:schemeClr val="accent2"/>
-                </a:solidFill>
-              </a:rPr>
-              <a:t>Try It!</a:t>
-            </a:r>
-            <a:r>
-              <a:rPr lang="en-US" sz="2800" dirty="0" smtClean="0"/>
-              <a:t> </a:t>
-            </a:r>
-          </a:p>
-          <a:p>
-            <a:pPr marL="0" indent="0">
+              <a:rPr lang="en-US" sz="3200" dirty="0" smtClean="0">
+                <a:solidFill>
+                  <a:srgbClr val="0070C0"/>
+                </a:solidFill>
+              </a:rPr>
+              <a:t>Non-Terminating Errors </a:t>
+            </a:r>
+            <a:r>
+              <a:rPr lang="en-US" sz="3200" dirty="0" smtClean="0">
+                <a:solidFill>
+                  <a:schemeClr val="tx1"/>
+                </a:solidFill>
+              </a:rPr>
+              <a:t>:  </a:t>
+            </a:r>
+          </a:p>
+          <a:p>
+            <a:pPr marL="201168" lvl="1" indent="0">
               <a:buNone/>
             </a:pPr>
             <a:r>
-              <a:rPr lang="en-US" sz="2800" dirty="0"/>
-              <a:t>"Hello from </a:t>
-            </a:r>
-            <a:r>
-              <a:rPr lang="en-US" sz="2800" dirty="0" smtClean="0"/>
-              <a:t>(</a:t>
-            </a:r>
-            <a:r>
-              <a:rPr lang="en-US" sz="2800" dirty="0"/>
-              <a:t>Get-Service </a:t>
-            </a:r>
-            <a:r>
-              <a:rPr lang="en-US" sz="2800" dirty="0" err="1" smtClean="0"/>
-              <a:t>WinRM</a:t>
-            </a:r>
-            <a:r>
-              <a:rPr lang="en-US" sz="2800" dirty="0" smtClean="0"/>
-              <a:t>).</a:t>
-            </a:r>
-            <a:r>
-              <a:rPr lang="en-US" sz="2800" dirty="0" err="1" smtClean="0"/>
-              <a:t>DisplayName</a:t>
-            </a:r>
-            <a:r>
-              <a:rPr lang="en-US" sz="2800" dirty="0" smtClean="0"/>
-              <a:t>"</a:t>
-            </a:r>
-          </a:p>
-          <a:p>
-            <a:pPr marL="0" indent="0">
-              <a:buNone/>
-            </a:pPr>
-            <a:r>
-              <a:rPr lang="en-US" sz="2800" dirty="0" smtClean="0"/>
-              <a:t>"Today's date is Get-Date."</a:t>
-            </a:r>
+              <a:rPr lang="en-US" sz="3200" dirty="0" smtClean="0">
+                <a:solidFill>
+                  <a:schemeClr val="tx1"/>
+                </a:solidFill>
+              </a:rPr>
+              <a:t>	try {  Get-Service -ServiceName foo `</a:t>
+            </a:r>
+            <a:br>
+              <a:rPr lang="en-US" sz="3200" dirty="0" smtClean="0">
+                <a:solidFill>
+                  <a:schemeClr val="tx1"/>
+                </a:solidFill>
+              </a:rPr>
+            </a:br>
+            <a:r>
+              <a:rPr lang="en-US" sz="3200" dirty="0" smtClean="0">
+                <a:solidFill>
+                  <a:schemeClr val="tx1"/>
+                </a:solidFill>
+              </a:rPr>
+              <a:t>                  </a:t>
+            </a:r>
+            <a:r>
+              <a:rPr lang="en-US" sz="3200" dirty="0" smtClean="0">
+                <a:solidFill>
+                  <a:srgbClr val="FF0000"/>
+                </a:solidFill>
+              </a:rPr>
+              <a:t> -ErrorAction Stop</a:t>
+            </a:r>
+            <a:r>
+              <a:rPr lang="en-US" sz="3200" dirty="0" smtClean="0">
+                <a:solidFill>
+                  <a:schemeClr val="tx1"/>
+                </a:solidFill>
+              </a:rPr>
+              <a:t> }</a:t>
+            </a:r>
+            <a:br>
+              <a:rPr lang="en-US" sz="3200" dirty="0" smtClean="0">
+                <a:solidFill>
+                  <a:schemeClr val="tx1"/>
+                </a:solidFill>
+              </a:rPr>
+            </a:br>
+            <a:r>
+              <a:rPr lang="en-US" sz="3200" dirty="0" smtClean="0">
+                <a:solidFill>
+                  <a:schemeClr val="tx1"/>
+                </a:solidFill>
+              </a:rPr>
+              <a:t>        catch { &lt;Handle the error }</a:t>
+            </a:r>
+            <a:endParaRPr lang="en-US" sz="3200" dirty="0">
+              <a:solidFill>
+                <a:schemeClr val="tx1"/>
+              </a:solidFill>
+            </a:endParaRPr>
           </a:p>
         </p:txBody>
       </p:sp>
     </p:spTree>
     <p:extLst>
       <p:ext uri="{BB962C8B-B14F-4D97-AF65-F5344CB8AC3E}">
-        <p14:creationId xmlns:p14="http://schemas.microsoft.com/office/powerpoint/2010/main" val="2562263826"/>
+        <p14:creationId xmlns:p14="http://schemas.microsoft.com/office/powerpoint/2010/main" val="992473636"/>
       </p:ext>
     </p:extLst>
   </p:cSld>
   <p:clrMapOvr>
     <a:masterClrMapping/>
   </p:clrMapOvr>
+  <p:timing>
+    <p:tnLst>
+      <p:par>
+        <p:cTn id="1" dur="indefinite" restart="never" nodeType="tmRoot"/>
+      </p:par>
+    </p:tnLst>
+  </p:timing>
 </p:sld>
 </file>
 
@@ -6629,10 +6534,10 @@
           <a:lstStyle/>
           <a:p>
             <a:r>
-              <a:rPr lang="en-US" smtClean="0"/>
-              <a:t>Important properties and methods</a:t>
-            </a:r>
-            <a:endParaRPr lang="en-US"/>
+              <a:rPr lang="en-US" dirty="0" smtClean="0"/>
+              <a:t>Subexpression  $(…)</a:t>
+            </a:r>
+            <a:endParaRPr lang="en-US" dirty="0"/>
           </a:p>
         </p:txBody>
       </p:sp>
@@ -6646,111 +6551,25 @@
             <p:ph idx="1"/>
           </p:nvPr>
         </p:nvSpPr>
-        <p:spPr/>
-        <p:txBody>
-          <a:bodyPr/>
-          <a:lstStyle/>
-          <a:p>
-            <a:r>
-              <a:rPr lang="en-US" sz="2400" b="1" smtClean="0">
-                <a:solidFill>
-                  <a:schemeClr val="accent2"/>
-                </a:solidFill>
-              </a:rPr>
-              <a:t>Text</a:t>
-            </a:r>
-            <a:r>
-              <a:rPr lang="en-US" sz="2400" smtClean="0"/>
-              <a:t>:  display</a:t>
-            </a:r>
-          </a:p>
-          <a:p>
-            <a:r>
-              <a:rPr lang="en-US" sz="2400" b="1" smtClean="0">
-                <a:solidFill>
-                  <a:schemeClr val="accent2"/>
-                </a:solidFill>
-              </a:rPr>
-              <a:t>Name</a:t>
-            </a:r>
-            <a:r>
-              <a:rPr lang="en-US" sz="2400" smtClean="0"/>
-              <a:t>: internal name, typically (type&lt;Name&gt;)</a:t>
-            </a:r>
-          </a:p>
-          <a:p>
-            <a:r>
-              <a:rPr lang="en-US" smtClean="0"/>
-              <a:t>-------------------</a:t>
-            </a:r>
-          </a:p>
-          <a:p>
-            <a:r>
-              <a:rPr lang="en-US" sz="2400" smtClean="0">
-                <a:solidFill>
-                  <a:schemeClr val="accent2"/>
-                </a:solidFill>
-              </a:rPr>
-              <a:t>Button</a:t>
-            </a:r>
-            <a:r>
-              <a:rPr lang="en-US" smtClean="0"/>
-              <a:t>:  </a:t>
-            </a:r>
-          </a:p>
+        <p:spPr>
+          <a:xfrm>
+            <a:off x="1097280" y="1845733"/>
+            <a:ext cx="10058400" cy="4427247"/>
+          </a:xfrm>
+        </p:spPr>
+        <p:txBody>
+          <a:bodyPr>
+            <a:noAutofit/>
+          </a:bodyPr>
+          <a:lstStyle/>
           <a:p>
             <a:pPr>
               <a:buFont typeface="Arial" panose="020B0604020202020204" pitchFamily="34" charset="0"/>
               <a:buChar char="•"/>
             </a:pPr>
             <a:r>
-              <a:rPr lang="en-US"/>
-              <a:t> </a:t>
-            </a:r>
-            <a:r>
-              <a:rPr lang="en-US" b="1" smtClean="0"/>
-              <a:t>DialogResult</a:t>
-            </a:r>
-            <a:r>
-              <a:rPr lang="en-US" smtClean="0"/>
-              <a:t>: Predetermines behavior. To control, set to </a:t>
-            </a:r>
-            <a:r>
-              <a:rPr lang="en-US" b="1" smtClean="0"/>
-              <a:t>None</a:t>
-            </a:r>
-            <a:r>
-              <a:rPr lang="en-US" smtClean="0"/>
-              <a:t>.</a:t>
-            </a:r>
-          </a:p>
-          <a:p>
-            <a:pPr marL="0" indent="0">
-              <a:buNone/>
-            </a:pPr>
-            <a:r>
-              <a:rPr lang="en-US" sz="2400" smtClean="0">
-                <a:solidFill>
-                  <a:schemeClr val="accent2"/>
-                </a:solidFill>
-              </a:rPr>
-              <a:t> Textbox</a:t>
-            </a:r>
-            <a:r>
-              <a:rPr lang="en-US" sz="2400">
-                <a:solidFill>
-                  <a:schemeClr val="accent2"/>
-                </a:solidFill>
-              </a:rPr>
-              <a:t>, </a:t>
-            </a:r>
-            <a:r>
-              <a:rPr lang="en-US" sz="2400" smtClean="0">
-                <a:solidFill>
-                  <a:schemeClr val="accent2"/>
-                </a:solidFill>
-              </a:rPr>
-              <a:t>RichTextBox: </a:t>
+              <a:rPr lang="en-US" sz="2800" dirty="0" smtClean="0"/>
+              <a:t> Evaluates the statements in parentheses</a:t>
             </a:r>
           </a:p>
           <a:p>
@@ -6759,8 +6578,8 @@
               <a:buChar char="•"/>
             </a:pPr>
             <a:r>
-              <a:rPr lang="en-US" b="1" smtClean="0"/>
-              <a:t> Multiline</a:t>
+              <a:rPr lang="en-US" sz="2800" dirty="0" smtClean="0"/>
+              <a:t> Includes the output in the result.</a:t>
             </a:r>
           </a:p>
           <a:p>
@@ -6769,33 +6588,104 @@
               <a:buChar char="•"/>
             </a:pPr>
             <a:r>
-              <a:rPr lang="en-US" b="1" smtClean="0"/>
-              <a:t>ReadOnly</a:t>
-            </a:r>
-            <a:endParaRPr lang="en-US" b="1"/>
-          </a:p>
-          <a:p>
-            <a:endParaRPr lang="en-US"/>
+              <a:rPr lang="en-US" sz="2800" dirty="0"/>
+              <a:t> </a:t>
+            </a:r>
+            <a:r>
+              <a:rPr lang="en-US" sz="2800" dirty="0" smtClean="0"/>
+              <a:t>Required for multiple statements and properties of an object.</a:t>
+            </a:r>
+          </a:p>
+          <a:p>
+            <a:pPr>
+              <a:buFont typeface="Arial" panose="020B0604020202020204" pitchFamily="34" charset="0"/>
+              <a:buChar char="•"/>
+            </a:pPr>
+            <a:r>
+              <a:rPr lang="en-US" sz="2800" dirty="0"/>
+              <a:t> </a:t>
+            </a:r>
+            <a:r>
+              <a:rPr lang="en-US" sz="2800" dirty="0" smtClean="0"/>
+              <a:t>Avoids intermediate variable</a:t>
+            </a:r>
+            <a:br>
+              <a:rPr lang="en-US" sz="2800" dirty="0" smtClean="0"/>
+            </a:br>
+            <a:endParaRPr lang="en-US" sz="2800" dirty="0" smtClean="0"/>
+          </a:p>
+          <a:p>
+            <a:pPr>
+              <a:buFont typeface="Arial" panose="020B0604020202020204" pitchFamily="34" charset="0"/>
+              <a:buChar char="•"/>
+            </a:pPr>
+            <a:r>
+              <a:rPr lang="en-US" sz="2800" dirty="0" smtClean="0">
+                <a:solidFill>
+                  <a:schemeClr val="accent2"/>
+                </a:solidFill>
+              </a:rPr>
+              <a:t>Try It!</a:t>
+            </a:r>
+            <a:r>
+              <a:rPr lang="en-US" sz="2800" dirty="0" smtClean="0"/>
+              <a:t> </a:t>
+            </a:r>
+          </a:p>
+          <a:p>
+            <a:pPr marL="0" indent="0">
+              <a:buNone/>
+            </a:pPr>
+            <a:r>
+              <a:rPr lang="en-US" sz="2800" dirty="0"/>
+              <a:t>"Hello from </a:t>
+            </a:r>
+            <a:r>
+              <a:rPr lang="en-US" sz="2800" dirty="0" smtClean="0"/>
+              <a:t>(</a:t>
+            </a:r>
+            <a:r>
+              <a:rPr lang="en-US" sz="2800" dirty="0"/>
+              <a:t>Get-Service </a:t>
+            </a:r>
+            <a:r>
+              <a:rPr lang="en-US" sz="2800" dirty="0" err="1" smtClean="0"/>
+              <a:t>WinRM</a:t>
+            </a:r>
+            <a:r>
+              <a:rPr lang="en-US" sz="2800" dirty="0" smtClean="0"/>
+              <a:t>).</a:t>
+            </a:r>
+            <a:r>
+              <a:rPr lang="en-US" sz="2800" dirty="0" err="1" smtClean="0"/>
+              <a:t>DisplayName</a:t>
+            </a:r>
+            <a:r>
+              <a:rPr lang="en-US" sz="2800" dirty="0" smtClean="0"/>
+              <a:t>"</a:t>
+            </a:r>
+          </a:p>
+          <a:p>
+            <a:pPr marL="0" indent="0">
+              <a:buNone/>
+            </a:pPr>
+            <a:r>
+              <a:rPr lang="en-US" sz="2800" dirty="0" smtClean="0"/>
+              <a:t>"Today's date is Get-Date."</a:t>
+            </a:r>
           </a:p>
         </p:txBody>
       </p:sp>
     </p:spTree>
     <p:extLst>
       <p:ext uri="{BB962C8B-B14F-4D97-AF65-F5344CB8AC3E}">
-        <p14:creationId xmlns:p14="http://schemas.microsoft.com/office/powerpoint/2010/main" val="2654660063"/>
+        <p14:creationId xmlns:p14="http://schemas.microsoft.com/office/powerpoint/2010/main" val="2562263826"/>
       </p:ext>
     </p:extLst>
   </p:cSld>
   <p:clrMapOvr>
     <a:masterClrMapping/>
   </p:clrMapOvr>
-  <p:timing>
-    <p:tnLst>
-      <p:par>
-        <p:cTn id="1" dur="indefinite" restart="never" nodeType="tmRoot"/>
-      </p:par>
-    </p:tnLst>
-  </p:timing>
 </p:sld>
 </file>
 
@@ -6832,18 +6722,10 @@
           <a:lstStyle/>
           <a:p>
             <a:r>
-              <a:rPr lang="en-US" dirty="0" smtClean="0"/>
-              <a:t>GUI </a:t>
-            </a:r>
-            <a:r>
-              <a:rPr lang="en-US" dirty="0" err="1" smtClean="0"/>
-              <a:t>CheatSheet</a:t>
-            </a:r>
-            <a:r>
-              <a:rPr lang="en-US" dirty="0" smtClean="0"/>
-              <a:t>:</a:t>
-            </a:r>
-            <a:endParaRPr lang="en-US" dirty="0"/>
+              <a:rPr lang="en-US" smtClean="0"/>
+              <a:t>Important properties and methods</a:t>
+            </a:r>
+            <a:endParaRPr lang="en-US"/>
           </a:p>
         </p:txBody>
       </p:sp>
@@ -6857,35 +6739,111 @@
             <p:ph idx="1"/>
           </p:nvPr>
         </p:nvSpPr>
-        <p:spPr>
-          <a:xfrm>
-            <a:off x="1083425" y="1845733"/>
-            <a:ext cx="10058400" cy="4319539"/>
-          </a:xfrm>
-        </p:spPr>
+        <p:spPr/>
         <p:txBody>
           <a:bodyPr/>
           <a:lstStyle/>
+          <a:p>
+            <a:r>
+              <a:rPr lang="en-US" sz="2400" b="1" smtClean="0">
+                <a:solidFill>
+                  <a:schemeClr val="accent2"/>
+                </a:solidFill>
+              </a:rPr>
+              <a:t>Text</a:t>
+            </a:r>
+            <a:r>
+              <a:rPr lang="en-US" sz="2400" smtClean="0"/>
+              <a:t>:  display</a:t>
+            </a:r>
+          </a:p>
+          <a:p>
+            <a:r>
+              <a:rPr lang="en-US" sz="2400" b="1" smtClean="0">
+                <a:solidFill>
+                  <a:schemeClr val="accent2"/>
+                </a:solidFill>
+              </a:rPr>
+              <a:t>Name</a:t>
+            </a:r>
+            <a:r>
+              <a:rPr lang="en-US" sz="2400" smtClean="0"/>
+              <a:t>: internal name, typically (type&lt;Name&gt;)</a:t>
+            </a:r>
+          </a:p>
+          <a:p>
+            <a:r>
+              <a:rPr lang="en-US" smtClean="0"/>
+              <a:t>-------------------</a:t>
+            </a:r>
+          </a:p>
+          <a:p>
+            <a:r>
+              <a:rPr lang="en-US" sz="2400" smtClean="0">
+                <a:solidFill>
+                  <a:schemeClr val="accent2"/>
+                </a:solidFill>
+              </a:rPr>
+              <a:t>Button</a:t>
+            </a:r>
+            <a:r>
+              <a:rPr lang="en-US" smtClean="0"/>
+              <a:t>:  </a:t>
+            </a:r>
+          </a:p>
           <a:p>
             <a:pPr>
               <a:buFont typeface="Arial" panose="020B0604020202020204" pitchFamily="34" charset="0"/>
               <a:buChar char="•"/>
             </a:pPr>
             <a:r>
-              <a:rPr lang="en-US" dirty="0" smtClean="0"/>
-              <a:t>  </a:t>
-            </a:r>
-            <a:r>
-              <a:rPr lang="en-US" sz="2400" dirty="0" smtClean="0">
+              <a:rPr lang="en-US"/>
+              <a:t> </a:t>
+            </a:r>
+            <a:r>
+              <a:rPr lang="en-US" b="1" smtClean="0"/>
+              <a:t>DialogResult</a:t>
+            </a:r>
+            <a:r>
+              <a:rPr lang="en-US" smtClean="0"/>
+              <a:t>: Predetermines behavior. To control, set to </a:t>
+            </a:r>
+            <a:r>
+              <a:rPr lang="en-US" b="1" smtClean="0"/>
+              <a:t>None</a:t>
+            </a:r>
+            <a:r>
+              <a:rPr lang="en-US" smtClean="0"/>
+              <a:t>.</a:t>
+            </a:r>
+          </a:p>
+          <a:p>
+            <a:pPr marL="0" indent="0">
+              <a:buNone/>
+            </a:pPr>
+            <a:r>
+              <a:rPr lang="en-US" sz="2400" smtClean="0">
                 <a:solidFill>
                   <a:schemeClr val="accent2"/>
                 </a:solidFill>
               </a:rPr>
-              <a:t>Think in events</a:t>
-            </a:r>
-            <a:r>
-              <a:rPr lang="en-US" sz="2400" dirty="0" smtClean="0"/>
-              <a:t>: Place the code in the event that should trigger it.</a:t>
+              <a:t> Textbox</a:t>
+            </a:r>
+            <a:r>
+              <a:rPr lang="en-US" sz="2400">
+                <a:solidFill>
+                  <a:schemeClr val="accent2"/>
+                </a:solidFill>
+              </a:rPr>
+              <a:t>, </a:t>
+            </a:r>
+            <a:r>
+              <a:rPr lang="en-US" sz="2400" smtClean="0">
+                <a:solidFill>
+                  <a:schemeClr val="accent2"/>
+                </a:solidFill>
+              </a:rPr>
+              <a:t>RichTextBox: </a:t>
             </a:r>
           </a:p>
           <a:p>
@@ -6894,20 +6852,8 @@
               <a:buChar char="•"/>
             </a:pPr>
             <a:r>
-              <a:rPr lang="en-US" sz="2400" dirty="0"/>
-              <a:t> </a:t>
-            </a:r>
-            <a:r>
-              <a:rPr lang="en-US" sz="2400" dirty="0" smtClean="0">
-                <a:solidFill>
-                  <a:schemeClr val="accent2"/>
-                </a:solidFill>
-              </a:rPr>
-              <a:t>Control the output</a:t>
-            </a:r>
-            <a:r>
-              <a:rPr lang="en-US" sz="2400" dirty="0" smtClean="0"/>
-              <a:t>:  You manage the display</a:t>
+              <a:rPr lang="en-US" b="1" smtClean="0"/>
+              <a:t> Multiline</a:t>
             </a:r>
           </a:p>
           <a:p>
@@ -6916,172 +6862,20 @@
               <a:buChar char="•"/>
             </a:pPr>
             <a:r>
-              <a:rPr lang="en-US" sz="2400" dirty="0"/>
-              <a:t> </a:t>
-            </a:r>
-            <a:r>
-              <a:rPr lang="en-US" sz="2400" dirty="0" smtClean="0">
-                <a:solidFill>
-                  <a:schemeClr val="accent2"/>
-                </a:solidFill>
-              </a:rPr>
-              <a:t>Control errors</a:t>
-            </a:r>
-            <a:r>
-              <a:rPr lang="en-US" sz="2400" dirty="0" smtClean="0"/>
-              <a:t>: You manage the display :  </a:t>
-            </a:r>
-            <a:br>
-              <a:rPr lang="en-US" sz="2400" dirty="0" smtClean="0"/>
-            </a:br>
-            <a:r>
-              <a:rPr lang="en-US" sz="2400" dirty="0" smtClean="0"/>
-              <a:t>	Use </a:t>
-            </a:r>
-            <a:r>
-              <a:rPr lang="en-US" sz="2400" dirty="0" smtClean="0">
-                <a:solidFill>
-                  <a:schemeClr val="accent2"/>
-                </a:solidFill>
-              </a:rPr>
-              <a:t>msgbox, $error[0].</a:t>
-            </a:r>
-            <a:r>
-              <a:rPr lang="en-US" sz="2400" dirty="0" err="1" smtClean="0">
-                <a:solidFill>
-                  <a:schemeClr val="accent2"/>
-                </a:solidFill>
-              </a:rPr>
-              <a:t>Exception.Message</a:t>
-            </a:r>
-            <a:endParaRPr lang="en-US" sz="2400" dirty="0" smtClean="0">
-              <a:solidFill>
-                <a:schemeClr val="accent2"/>
-              </a:solidFill>
-            </a:endParaRPr>
-          </a:p>
-          <a:p>
-            <a:pPr>
-              <a:buFont typeface="Arial" panose="020B0604020202020204" pitchFamily="34" charset="0"/>
-              <a:buChar char="•"/>
-            </a:pPr>
-            <a:r>
-              <a:rPr lang="en-US" sz="2400" dirty="0"/>
-              <a:t> </a:t>
-            </a:r>
-            <a:r>
-              <a:rPr lang="en-US" sz="2400" dirty="0" smtClean="0">
-                <a:solidFill>
-                  <a:schemeClr val="accent2"/>
-                </a:solidFill>
-              </a:rPr>
-              <a:t>Dialog result</a:t>
-            </a:r>
-            <a:r>
-              <a:rPr lang="en-US" sz="2400" dirty="0" smtClean="0"/>
-              <a:t> button property:  To control the button, set it to </a:t>
-            </a:r>
-            <a:r>
-              <a:rPr lang="en-US" sz="2400" b="1" dirty="0" smtClean="0"/>
-              <a:t>None</a:t>
-            </a:r>
-            <a:r>
-              <a:rPr lang="en-US" sz="2400" dirty="0" smtClean="0"/>
-              <a:t>.</a:t>
-            </a:r>
-          </a:p>
-          <a:p>
-            <a:pPr>
-              <a:buFont typeface="Arial" panose="020B0604020202020204" pitchFamily="34" charset="0"/>
-              <a:buChar char="•"/>
-            </a:pPr>
-            <a:r>
-              <a:rPr lang="en-US" sz="2400" dirty="0" smtClean="0"/>
-              <a:t>To format strings, use </a:t>
-            </a:r>
-            <a:r>
-              <a:rPr lang="en-US" sz="2400" dirty="0" smtClean="0">
-                <a:solidFill>
-                  <a:schemeClr val="accent2"/>
-                </a:solidFill>
-              </a:rPr>
-              <a:t>Out-String</a:t>
-            </a:r>
-            <a:r>
-              <a:rPr lang="en-US" sz="2400" dirty="0" smtClean="0"/>
-              <a:t> (converts objects into a single string)</a:t>
-            </a:r>
-          </a:p>
-          <a:p>
-            <a:pPr>
-              <a:buFont typeface="Arial" panose="020B0604020202020204" pitchFamily="34" charset="0"/>
-              <a:buChar char="•"/>
-            </a:pPr>
-            <a:r>
-              <a:rPr lang="en-US" sz="2400" dirty="0" smtClean="0"/>
-              <a:t>To display properties as strings, use </a:t>
-            </a:r>
-            <a:r>
-              <a:rPr lang="en-US" sz="2400" dirty="0" smtClean="0">
-                <a:solidFill>
-                  <a:schemeClr val="accent2"/>
-                </a:solidFill>
-              </a:rPr>
-              <a:t>subexpression</a:t>
-            </a:r>
-            <a:r>
-              <a:rPr lang="en-US" sz="2400" dirty="0" smtClean="0"/>
-              <a:t> $(...)</a:t>
-            </a:r>
-          </a:p>
-          <a:p>
-            <a:pPr>
-              <a:buFont typeface="Arial" panose="020B0604020202020204" pitchFamily="34" charset="0"/>
-              <a:buChar char="•"/>
-            </a:pPr>
-            <a:r>
-              <a:rPr lang="en-US" sz="2400" dirty="0" smtClean="0"/>
-              <a:t>To display </a:t>
-            </a:r>
-            <a:r>
-              <a:rPr lang="en-US" sz="2400" dirty="0" smtClean="0">
-                <a:solidFill>
-                  <a:schemeClr val="accent2"/>
-                </a:solidFill>
-              </a:rPr>
-              <a:t>monospace font</a:t>
-            </a:r>
-            <a:r>
-              <a:rPr lang="en-US" sz="2400" dirty="0" smtClean="0"/>
-              <a:t> in a textbox:</a:t>
-            </a:r>
-            <a:br>
-              <a:rPr lang="en-US" sz="2400" dirty="0" smtClean="0"/>
-            </a:br>
-            <a:r>
-              <a:rPr lang="en-US" sz="2400" dirty="0" smtClean="0"/>
-              <a:t>            Right-Click </a:t>
-            </a:r>
-            <a:r>
-              <a:rPr lang="en-US" sz="2400" dirty="0" smtClean="0">
-                <a:sym typeface="Wingdings" panose="05000000000000000000" pitchFamily="2" charset="2"/>
-              </a:rPr>
-              <a:t> Apply Property Set / Apply Console Font</a:t>
-            </a:r>
-            <a:r>
-              <a:rPr lang="en-US" sz="2400" dirty="0" smtClean="0"/>
-              <a:t>  </a:t>
-            </a:r>
-          </a:p>
-          <a:p>
-            <a:endParaRPr lang="en-US" dirty="0"/>
+              <a:rPr lang="en-US" b="1" smtClean="0"/>
+              <a:t>ReadOnly</a:t>
+            </a:r>
+            <a:endParaRPr lang="en-US" b="1"/>
+          </a:p>
+          <a:p>
+            <a:endParaRPr lang="en-US"/>
           </a:p>
         </p:txBody>
       </p:sp>
     </p:spTree>
     <p:extLst>
       <p:ext uri="{BB962C8B-B14F-4D97-AF65-F5344CB8AC3E}">
-        <p14:creationId xmlns:p14="http://schemas.microsoft.com/office/powerpoint/2010/main" val="3827705658"/>
+        <p14:creationId xmlns:p14="http://schemas.microsoft.com/office/powerpoint/2010/main" val="2654660063"/>
       </p:ext>
     </p:extLst>
   </p:cSld>
@@ -7131,10 +6925,18 @@
           <a:lstStyle/>
           <a:p>
             <a:r>
-              <a:rPr lang="en-US" smtClean="0"/>
-              <a:t>Part 1:  Simple GUI -&gt; Out-GridView</a:t>
-            </a:r>
-            <a:endParaRPr lang="en-US"/>
+              <a:rPr lang="en-US" dirty="0" smtClean="0"/>
+              <a:t>GUI </a:t>
+            </a:r>
+            <a:r>
+              <a:rPr lang="en-US" dirty="0" err="1" smtClean="0"/>
+              <a:t>CheatSheet</a:t>
+            </a:r>
+            <a:r>
+              <a:rPr lang="en-US" dirty="0" smtClean="0"/>
+              <a:t>:</a:t>
+            </a:r>
+            <a:endParaRPr lang="en-US" dirty="0"/>
           </a:p>
         </p:txBody>
       </p:sp>
@@ -7148,86 +6950,231 @@
             <p:ph idx="1"/>
           </p:nvPr>
         </p:nvSpPr>
-        <p:spPr/>
+        <p:spPr>
+          <a:xfrm>
+            <a:off x="1083425" y="1845733"/>
+            <a:ext cx="10058400" cy="4319539"/>
+          </a:xfrm>
+        </p:spPr>
         <p:txBody>
           <a:bodyPr/>
           <a:lstStyle/>
           <a:p>
-            <a:endParaRPr lang="en-US" smtClean="0"/>
-          </a:p>
-          <a:p>
-            <a:r>
-              <a:rPr lang="en-US" sz="3200" smtClean="0">
-                <a:solidFill>
-                  <a:schemeClr val="tx2"/>
-                </a:solidFill>
-              </a:rPr>
-              <a:t>Input :		</a:t>
-            </a:r>
-            <a:r>
-              <a:rPr lang="en-US" sz="3200" smtClean="0">
-                <a:solidFill>
-                  <a:srgbClr val="0070C0"/>
-                </a:solidFill>
-              </a:rPr>
-              <a:t>Textbox, Buttons</a:t>
-            </a:r>
-          </a:p>
-          <a:p>
-            <a:r>
-              <a:rPr lang="en-US" sz="3200" smtClean="0">
-                <a:solidFill>
-                  <a:schemeClr val="tx2"/>
-                </a:solidFill>
-              </a:rPr>
-              <a:t>Processing: 	</a:t>
-            </a:r>
-            <a:r>
-              <a:rPr lang="en-US" sz="3200" smtClean="0">
-                <a:solidFill>
-                  <a:srgbClr val="0070C0"/>
-                </a:solidFill>
-              </a:rPr>
-              <a:t>Script</a:t>
-            </a:r>
-          </a:p>
-          <a:p>
-            <a:r>
-              <a:rPr lang="en-US" sz="3200" smtClean="0">
-                <a:solidFill>
-                  <a:schemeClr val="tx2"/>
-                </a:solidFill>
-              </a:rPr>
-              <a:t>Output: </a:t>
-            </a:r>
-            <a:r>
-              <a:rPr lang="en-US" sz="3200" smtClean="0"/>
-              <a:t>		</a:t>
-            </a:r>
-            <a:r>
-              <a:rPr lang="en-US" sz="3200" smtClean="0">
-                <a:solidFill>
-                  <a:srgbClr val="0070C0"/>
-                </a:solidFill>
-              </a:rPr>
-              <a:t>Out-GridView</a:t>
-            </a:r>
-          </a:p>
-          <a:p>
-            <a:endParaRPr lang="en-US"/>
-          </a:p>
-          <a:p>
-            <a:pPr marL="0" indent="0">
-              <a:buNone/>
+            <a:pPr>
+              <a:buFont typeface="Arial" panose="020B0604020202020204" pitchFamily="34" charset="0"/>
+              <a:buChar char="•"/>
             </a:pPr>
-            <a:endParaRPr lang="en-US"/>
+            <a:r>
+              <a:rPr lang="en-US" dirty="0" smtClean="0"/>
+              <a:t>  </a:t>
+            </a:r>
+            <a:r>
+              <a:rPr lang="en-US" sz="2400" dirty="0" smtClean="0">
+                <a:solidFill>
+                  <a:schemeClr val="accent2"/>
+                </a:solidFill>
+              </a:rPr>
+              <a:t>Think in events</a:t>
+            </a:r>
+            <a:r>
+              <a:rPr lang="en-US" sz="2400" dirty="0" smtClean="0"/>
+              <a:t>: Place the code in the event that should trigger it.</a:t>
+            </a:r>
+          </a:p>
+          <a:p>
+            <a:pPr>
+              <a:buFont typeface="Arial" panose="020B0604020202020204" pitchFamily="34" charset="0"/>
+              <a:buChar char="•"/>
+            </a:pPr>
+            <a:r>
+              <a:rPr lang="en-US" sz="2400" dirty="0"/>
+              <a:t> </a:t>
+            </a:r>
+            <a:r>
+              <a:rPr lang="en-US" sz="2400" dirty="0" smtClean="0">
+                <a:solidFill>
+                  <a:schemeClr val="accent2"/>
+                </a:solidFill>
+              </a:rPr>
+              <a:t>Control the output</a:t>
+            </a:r>
+            <a:r>
+              <a:rPr lang="en-US" sz="2400" dirty="0" smtClean="0"/>
+              <a:t>:  You manage the display</a:t>
+            </a:r>
+          </a:p>
+          <a:p>
+            <a:pPr>
+              <a:buFont typeface="Arial" panose="020B0604020202020204" pitchFamily="34" charset="0"/>
+              <a:buChar char="•"/>
+            </a:pPr>
+            <a:r>
+              <a:rPr lang="en-US" sz="2400" dirty="0"/>
+              <a:t> </a:t>
+            </a:r>
+            <a:r>
+              <a:rPr lang="en-US" sz="2400" dirty="0" smtClean="0">
+                <a:solidFill>
+                  <a:schemeClr val="accent2"/>
+                </a:solidFill>
+              </a:rPr>
+              <a:t>Control errors</a:t>
+            </a:r>
+            <a:r>
+              <a:rPr lang="en-US" sz="2400" dirty="0" smtClean="0"/>
+              <a:t>: You manage the display :  </a:t>
+            </a:r>
+            <a:br>
+              <a:rPr lang="en-US" sz="2400" dirty="0" smtClean="0"/>
+            </a:br>
+            <a:r>
+              <a:rPr lang="en-US" sz="2400" dirty="0" smtClean="0"/>
+              <a:t>	Use </a:t>
+            </a:r>
+            <a:r>
+              <a:rPr lang="en-US" sz="2400" dirty="0" smtClean="0">
+                <a:solidFill>
+                  <a:schemeClr val="accent2"/>
+                </a:solidFill>
+              </a:rPr>
+              <a:t>msgbox, $error[0].</a:t>
+            </a:r>
+            <a:r>
+              <a:rPr lang="en-US" sz="2400" dirty="0" err="1" smtClean="0">
+                <a:solidFill>
+                  <a:schemeClr val="accent2"/>
+                </a:solidFill>
+              </a:rPr>
+              <a:t>Exception.Message</a:t>
+            </a:r>
+            <a:endParaRPr lang="en-US" sz="2400" dirty="0" smtClean="0">
+              <a:solidFill>
+                <a:schemeClr val="accent2"/>
+              </a:solidFill>
+            </a:endParaRPr>
+          </a:p>
+          <a:p>
+            <a:pPr>
+              <a:buFont typeface="Arial" panose="020B0604020202020204" pitchFamily="34" charset="0"/>
+              <a:buChar char="•"/>
+            </a:pPr>
+            <a:r>
+              <a:rPr lang="en-US" sz="2400" dirty="0"/>
+              <a:t> </a:t>
+            </a:r>
+            <a:r>
+              <a:rPr lang="en-US" sz="2400" dirty="0" smtClean="0">
+                <a:solidFill>
+                  <a:schemeClr val="accent2"/>
+                </a:solidFill>
+              </a:rPr>
+              <a:t>Dialog result</a:t>
+            </a:r>
+            <a:r>
+              <a:rPr lang="en-US" sz="2400" dirty="0" smtClean="0"/>
+              <a:t> button property:  To control the button, set it to </a:t>
+            </a:r>
+            <a:r>
+              <a:rPr lang="en-US" sz="2400" b="1" dirty="0" smtClean="0"/>
+              <a:t>None</a:t>
+            </a:r>
+            <a:r>
+              <a:rPr lang="en-US" sz="2400" dirty="0" smtClean="0"/>
+              <a:t>.</a:t>
+            </a:r>
+          </a:p>
+          <a:p>
+            <a:pPr>
+              <a:buFont typeface="Arial" panose="020B0604020202020204" pitchFamily="34" charset="0"/>
+              <a:buChar char="•"/>
+            </a:pPr>
+            <a:r>
+              <a:rPr lang="en-US" sz="2400" dirty="0" smtClean="0"/>
+              <a:t>To format strings, use </a:t>
+            </a:r>
+            <a:r>
+              <a:rPr lang="en-US" sz="2400" dirty="0" smtClean="0">
+                <a:solidFill>
+                  <a:schemeClr val="accent2"/>
+                </a:solidFill>
+              </a:rPr>
+              <a:t>Out-String</a:t>
+            </a:r>
+            <a:r>
+              <a:rPr lang="en-US" sz="2400" dirty="0" smtClean="0"/>
+              <a:t> (converts objects into a single string)</a:t>
+            </a:r>
+          </a:p>
+          <a:p>
+            <a:pPr>
+              <a:buFont typeface="Arial" panose="020B0604020202020204" pitchFamily="34" charset="0"/>
+              <a:buChar char="•"/>
+            </a:pPr>
+            <a:r>
+              <a:rPr lang="en-US" sz="2400" dirty="0" smtClean="0"/>
+              <a:t>To display properties as strings, use </a:t>
+            </a:r>
+            <a:r>
+              <a:rPr lang="en-US" sz="2400" dirty="0" smtClean="0">
+                <a:solidFill>
+                  <a:schemeClr val="accent2"/>
+                </a:solidFill>
+              </a:rPr>
+              <a:t>subexpression</a:t>
+            </a:r>
+            <a:r>
+              <a:rPr lang="en-US" sz="2400" dirty="0" smtClean="0"/>
+              <a:t> $(...)</a:t>
+            </a:r>
+          </a:p>
+          <a:p>
+            <a:pPr>
+              <a:buFont typeface="Arial" panose="020B0604020202020204" pitchFamily="34" charset="0"/>
+              <a:buChar char="•"/>
+            </a:pPr>
+            <a:r>
+              <a:rPr lang="en-US" sz="2400" dirty="0" smtClean="0"/>
+              <a:t>To display </a:t>
+            </a:r>
+            <a:r>
+              <a:rPr lang="en-US" sz="2400" dirty="0" smtClean="0">
+                <a:solidFill>
+                  <a:schemeClr val="accent2"/>
+                </a:solidFill>
+              </a:rPr>
+              <a:t>monospace font</a:t>
+            </a:r>
+            <a:r>
+              <a:rPr lang="en-US" sz="2400" dirty="0" smtClean="0"/>
+              <a:t> in a textbox:</a:t>
+            </a:r>
+            <a:br>
+              <a:rPr lang="en-US" sz="2400" dirty="0" smtClean="0"/>
+            </a:br>
+            <a:r>
+              <a:rPr lang="en-US" sz="2400" dirty="0" smtClean="0"/>
+              <a:t>            Right-Click </a:t>
+            </a:r>
+            <a:r>
+              <a:rPr lang="en-US" sz="2400" dirty="0" smtClean="0">
+                <a:sym typeface="Wingdings" panose="05000000000000000000" pitchFamily="2" charset="2"/>
+              </a:rPr>
+              <a:t> Apply Property Set / Apply Console Font</a:t>
+            </a:r>
+            <a:r>
+              <a:rPr lang="en-US" sz="2400" dirty="0" smtClean="0"/>
+              <a:t>  </a:t>
+            </a:r>
+          </a:p>
+          <a:p>
+            <a:endParaRPr lang="en-US" dirty="0"/>
           </a:p>
         </p:txBody>
       </p:sp>
     </p:spTree>
     <p:extLst>
       <p:ext uri="{BB962C8B-B14F-4D97-AF65-F5344CB8AC3E}">
-        <p14:creationId xmlns:p14="http://schemas.microsoft.com/office/powerpoint/2010/main" val="3058146967"/>
+        <p14:creationId xmlns:p14="http://schemas.microsoft.com/office/powerpoint/2010/main" val="3827705658"/>
       </p:ext>
     </p:extLst>
   </p:cSld>
@@ -7544,6 +7491,152 @@
       </p:grpSpPr>
       <p:sp>
         <p:nvSpPr>
+          <p:cNvPr id="2" name="Title 1"/>
+          <p:cNvSpPr>
+            <a:spLocks noGrp="1"/>
+          </p:cNvSpPr>
+          <p:nvPr>
+            <p:ph type="title"/>
+          </p:nvPr>
+        </p:nvSpPr>
+        <p:spPr/>
+        <p:txBody>
+          <a:bodyPr/>
+          <a:lstStyle/>
+          <a:p>
+            <a:r>
+              <a:rPr lang="en-US" smtClean="0"/>
+              <a:t>Part 1:  Simple GUI -&gt; Out-GridView</a:t>
+            </a:r>
+            <a:endParaRPr lang="en-US"/>
+          </a:p>
+        </p:txBody>
+      </p:sp>
+      <p:sp>
+        <p:nvSpPr>
+          <p:cNvPr id="3" name="Content Placeholder 2"/>
+          <p:cNvSpPr>
+            <a:spLocks noGrp="1"/>
+          </p:cNvSpPr>
+          <p:nvPr>
+            <p:ph idx="1"/>
+          </p:nvPr>
+        </p:nvSpPr>
+        <p:spPr/>
+        <p:txBody>
+          <a:bodyPr/>
+          <a:lstStyle/>
+          <a:p>
+            <a:endParaRPr lang="en-US" smtClean="0"/>
+          </a:p>
+          <a:p>
+            <a:r>
+              <a:rPr lang="en-US" sz="3200" smtClean="0">
+                <a:solidFill>
+                  <a:schemeClr val="tx2"/>
+                </a:solidFill>
+              </a:rPr>
+              <a:t>Input :		</a:t>
+            </a:r>
+            <a:r>
+              <a:rPr lang="en-US" sz="3200" smtClean="0">
+                <a:solidFill>
+                  <a:srgbClr val="0070C0"/>
+                </a:solidFill>
+              </a:rPr>
+              <a:t>Textbox, Buttons</a:t>
+            </a:r>
+          </a:p>
+          <a:p>
+            <a:r>
+              <a:rPr lang="en-US" sz="3200" smtClean="0">
+                <a:solidFill>
+                  <a:schemeClr val="tx2"/>
+                </a:solidFill>
+              </a:rPr>
+              <a:t>Processing: 	</a:t>
+            </a:r>
+            <a:r>
+              <a:rPr lang="en-US" sz="3200" smtClean="0">
+                <a:solidFill>
+                  <a:srgbClr val="0070C0"/>
+                </a:solidFill>
+              </a:rPr>
+              <a:t>Script</a:t>
+            </a:r>
+          </a:p>
+          <a:p>
+            <a:r>
+              <a:rPr lang="en-US" sz="3200" smtClean="0">
+                <a:solidFill>
+                  <a:schemeClr val="tx2"/>
+                </a:solidFill>
+              </a:rPr>
+              <a:t>Output: </a:t>
+            </a:r>
+            <a:r>
+              <a:rPr lang="en-US" sz="3200" smtClean="0"/>
+              <a:t>		</a:t>
+            </a:r>
+            <a:r>
+              <a:rPr lang="en-US" sz="3200" smtClean="0">
+                <a:solidFill>
+                  <a:srgbClr val="0070C0"/>
+                </a:solidFill>
+              </a:rPr>
+              <a:t>Out-GridView</a:t>
+            </a:r>
+          </a:p>
+          <a:p>
+            <a:endParaRPr lang="en-US"/>
+          </a:p>
+          <a:p>
+            <a:pPr marL="0" indent="0">
+              <a:buNone/>
+            </a:pPr>
+            <a:endParaRPr lang="en-US"/>
+          </a:p>
+        </p:txBody>
+      </p:sp>
+    </p:spTree>
+    <p:extLst>
+      <p:ext uri="{BB962C8B-B14F-4D97-AF65-F5344CB8AC3E}">
+        <p14:creationId xmlns:p14="http://schemas.microsoft.com/office/powerpoint/2010/main" val="3058146967"/>
+      </p:ext>
+    </p:extLst>
+  </p:cSld>
+  <p:clrMapOvr>
+    <a:masterClrMapping/>
+  </p:clrMapOvr>
+  <p:timing>
+    <p:tnLst>
+      <p:par>
+        <p:cTn id="1" dur="indefinite" restart="never" nodeType="tmRoot"/>
+      </p:par>
+    </p:tnLst>
+  </p:timing>
+</p:sld>
+</file>
+
+<file path=ppt/slides/slide21.xml><?xml version="1.0" encoding="utf-8"?>
+<p:sld xmlns:a="http://schemas.openxmlformats.org/drawingml/2006/main" xmlns:r="http://schemas.openxmlformats.org/officeDocument/2006/relationships" xmlns:p="http://schemas.openxmlformats.org/presentationml/2006/main">
+  <p:cSld>
+    <p:spTree>
+      <p:nvGrpSpPr>
+        <p:cNvPr id="1" name=""/>
+        <p:cNvGrpSpPr/>
+        <p:nvPr/>
+      </p:nvGrpSpPr>
+      <p:grpSpPr>
+        <a:xfrm>
+          <a:off x="0" y="0"/>
+          <a:ext cx="0" cy="0"/>
+          <a:chOff x="0" y="0"/>
+          <a:chExt cx="0" cy="0"/>
+        </a:xfrm>
+      </p:grpSpPr>
+      <p:sp>
+        <p:nvSpPr>
           <p:cNvPr id="5" name="Title 1"/>
           <p:cNvSpPr>
             <a:spLocks noGrp="1"/>
@@ -7609,7 +7702,7 @@
 </p:sld>
 </file>
 
-<file path=ppt/slides/slide21.xml><?xml version="1.0" encoding="utf-8"?>
+<file path=ppt/slides/slide22.xml><?xml version="1.0" encoding="utf-8"?>
 <p:sld xmlns:a="http://schemas.openxmlformats.org/drawingml/2006/main" xmlns:r="http://schemas.openxmlformats.org/officeDocument/2006/relationships" xmlns:p="http://schemas.openxmlformats.org/presentationml/2006/main">
   <p:cSld>
     <p:spTree>
@@ -7697,7 +7790,7 @@
 </p:sld>
 </file>
 
-<file path=ppt/slides/slide22.xml><?xml version="1.0" encoding="utf-8"?>
+<file path=ppt/slides/slide23.xml><?xml version="1.0" encoding="utf-8"?>
 <p:sld xmlns:a="http://schemas.openxmlformats.org/drawingml/2006/main" xmlns:r="http://schemas.openxmlformats.org/officeDocument/2006/relationships" xmlns:p="http://schemas.openxmlformats.org/presentationml/2006/main">
   <p:cSld>
     <p:spTree>
@@ -7929,7 +8022,7 @@
 </p:sld>
 </file>
 
-<file path=ppt/slides/slide23.xml><?xml version="1.0" encoding="utf-8"?>
+<file path=ppt/slides/slide24.xml><?xml version="1.0" encoding="utf-8"?>
 <p:sld xmlns:a="http://schemas.openxmlformats.org/drawingml/2006/main" xmlns:r="http://schemas.openxmlformats.org/officeDocument/2006/relationships" xmlns:p="http://schemas.openxmlformats.org/presentationml/2006/main">
   <p:cSld>
     <p:spTree>
@@ -8046,7 +8139,7 @@
 </p:sld>
 </file>
 
-<file path=ppt/slides/slide24.xml><?xml version="1.0" encoding="utf-8"?>
+<file path=ppt/slides/slide25.xml><?xml version="1.0" encoding="utf-8"?>
 <p:sld xmlns:a="http://schemas.openxmlformats.org/drawingml/2006/main" xmlns:r="http://schemas.openxmlformats.org/officeDocument/2006/relationships" xmlns:p="http://schemas.openxmlformats.org/presentationml/2006/main">
   <p:cSld>
     <p:spTree>
@@ -8241,7 +8334,7 @@
 </p:sld>
 </file>
 
-<file path=ppt/slides/slide25.xml><?xml version="1.0" encoding="utf-8"?>
+<file path=ppt/slides/slide26.xml><?xml version="1.0" encoding="utf-8"?>
 <p:sld xmlns:a="http://schemas.openxmlformats.org/drawingml/2006/main" xmlns:r="http://schemas.openxmlformats.org/officeDocument/2006/relationships" xmlns:p="http://schemas.openxmlformats.org/presentationml/2006/main">
   <p:cSld>
     <p:spTree>
@@ -8402,7 +8495,7 @@
 </p:sld>
 </file>
 
-<file path=ppt/slides/slide26.xml><?xml version="1.0" encoding="utf-8"?>
+<file path=ppt/slides/slide27.xml><?xml version="1.0" encoding="utf-8"?>
 <p:sld xmlns:a="http://schemas.openxmlformats.org/drawingml/2006/main" xmlns:r="http://schemas.openxmlformats.org/officeDocument/2006/relationships" xmlns:p="http://schemas.openxmlformats.org/presentationml/2006/main">
   <p:cSld>
     <p:spTree>
@@ -9095,6 +9188,141 @@
         </p:nvSpPr>
         <p:spPr/>
         <p:txBody>
+          <a:bodyPr/>
+          <a:lstStyle/>
+          <a:p>
+            <a:r>
+              <a:rPr lang="en-US" smtClean="0"/>
+              <a:t>GUI Application</a:t>
+            </a:r>
+            <a:endParaRPr lang="en-US"/>
+          </a:p>
+        </p:txBody>
+      </p:sp>
+      <p:sp>
+        <p:nvSpPr>
+          <p:cNvPr id="3" name="Content Placeholder 2"/>
+          <p:cNvSpPr>
+            <a:spLocks noGrp="1"/>
+          </p:cNvSpPr>
+          <p:nvPr>
+            <p:ph idx="1"/>
+          </p:nvPr>
+        </p:nvSpPr>
+        <p:spPr/>
+        <p:txBody>
+          <a:bodyPr>
+            <a:normAutofit/>
+          </a:bodyPr>
+          <a:lstStyle/>
+          <a:p>
+            <a:pPr>
+              <a:buFont typeface="Arial" panose="020B0604020202020204" pitchFamily="34" charset="0"/>
+              <a:buChar char="•"/>
+            </a:pPr>
+            <a:r>
+              <a:rPr lang="en-US" sz="3600" smtClean="0"/>
+              <a:t> A </a:t>
+            </a:r>
+            <a:r>
+              <a:rPr lang="en-US" sz="3600" smtClean="0">
+                <a:solidFill>
+                  <a:srgbClr val="0070C0"/>
+                </a:solidFill>
+              </a:rPr>
+              <a:t>GUI application</a:t>
+            </a:r>
+            <a:r>
+              <a:rPr lang="en-US" sz="3600" smtClean="0"/>
+              <a:t> consists of an unordered collection of event handlers.</a:t>
+            </a:r>
+          </a:p>
+          <a:p>
+            <a:pPr>
+              <a:buFont typeface="Arial" panose="020B0604020202020204" pitchFamily="34" charset="0"/>
+              <a:buChar char="•"/>
+            </a:pPr>
+            <a:endParaRPr lang="en-US" sz="3600"/>
+          </a:p>
+          <a:p>
+            <a:pPr>
+              <a:buFont typeface="Arial" panose="020B0604020202020204" pitchFamily="34" charset="0"/>
+              <a:buChar char="•"/>
+            </a:pPr>
+            <a:r>
+              <a:rPr lang="en-US" sz="3600" smtClean="0"/>
+              <a:t> The </a:t>
+            </a:r>
+            <a:r>
+              <a:rPr lang="en-US" sz="3600" smtClean="0">
+                <a:solidFill>
+                  <a:srgbClr val="0070C0"/>
+                </a:solidFill>
+              </a:rPr>
+              <a:t>order</a:t>
+            </a:r>
+            <a:r>
+              <a:rPr lang="en-US" sz="3600" smtClean="0"/>
+              <a:t> in which the code in the event handlers runs is </a:t>
+            </a:r>
+            <a:r>
+              <a:rPr lang="en-US" sz="3600" smtClean="0">
+                <a:solidFill>
+                  <a:srgbClr val="0070C0"/>
+                </a:solidFill>
+              </a:rPr>
+              <a:t>determined by the end-user</a:t>
+            </a:r>
+            <a:r>
+              <a:rPr lang="en-US" sz="3600" smtClean="0"/>
+              <a:t>.</a:t>
+            </a:r>
+            <a:endParaRPr lang="en-US" sz="3600"/>
+          </a:p>
+        </p:txBody>
+      </p:sp>
+    </p:spTree>
+    <p:extLst>
+      <p:ext uri="{BB962C8B-B14F-4D97-AF65-F5344CB8AC3E}">
+        <p14:creationId xmlns:p14="http://schemas.microsoft.com/office/powerpoint/2010/main" val="723009780"/>
+      </p:ext>
+    </p:extLst>
+  </p:cSld>
+  <p:clrMapOvr>
+    <a:masterClrMapping/>
+  </p:clrMapOvr>
+</p:sld>
+</file>
+
+<file path=ppt/slides/slide7.xml><?xml version="1.0" encoding="utf-8"?>
+<p:sld xmlns:a="http://schemas.openxmlformats.org/drawingml/2006/main" xmlns:r="http://schemas.openxmlformats.org/officeDocument/2006/relationships" xmlns:p="http://schemas.openxmlformats.org/presentationml/2006/main">
+  <p:cSld>
+    <p:spTree>
+      <p:nvGrpSpPr>
+        <p:cNvPr id="1" name=""/>
+        <p:cNvGrpSpPr/>
+        <p:nvPr/>
+      </p:nvGrpSpPr>
+      <p:grpSpPr>
+        <a:xfrm>
+          <a:off x="0" y="0"/>
+          <a:ext cx="0" cy="0"/>
+          <a:chOff x="0" y="0"/>
+          <a:chExt cx="0" cy="0"/>
+        </a:xfrm>
+      </p:grpSpPr>
+      <p:sp>
+        <p:nvSpPr>
+          <p:cNvPr id="2" name="Title 1"/>
+          <p:cNvSpPr>
+            <a:spLocks noGrp="1"/>
+          </p:cNvSpPr>
+          <p:nvPr>
+            <p:ph type="title"/>
+          </p:nvPr>
+        </p:nvSpPr>
+        <p:spPr/>
+        <p:txBody>
           <a:bodyPr>
             <a:normAutofit/>
           </a:bodyPr>
@@ -9267,7 +9495,7 @@
 </p:sld>
 </file>
 
-<file path=ppt/slides/slide7.xml><?xml version="1.0" encoding="utf-8"?>
+<file path=ppt/slides/slide8.xml><?xml version="1.0" encoding="utf-8"?>
 <p:sld xmlns:a="http://schemas.openxmlformats.org/drawingml/2006/main" xmlns:r="http://schemas.openxmlformats.org/officeDocument/2006/relationships" xmlns:p="http://schemas.openxmlformats.org/presentationml/2006/main">
   <p:cSld>
     <p:spTree>
@@ -9489,7 +9717,7 @@
 </p:sld>
 </file>
 
-<file path=ppt/slides/slide8.xml><?xml version="1.0" encoding="utf-8"?>
+<file path=ppt/slides/slide9.xml><?xml version="1.0" encoding="utf-8"?>
 <p:sld xmlns:a="http://schemas.openxmlformats.org/drawingml/2006/main" xmlns:r="http://schemas.openxmlformats.org/officeDocument/2006/relationships" xmlns:p="http://schemas.openxmlformats.org/presentationml/2006/main">
   <p:cSld>
     <p:spTree>
@@ -9724,98 +9952,6 @@
     <p:extLst>
       <p:ext uri="{BB962C8B-B14F-4D97-AF65-F5344CB8AC3E}">
         <p14:creationId xmlns:p14="http://schemas.microsoft.com/office/powerpoint/2010/main" val="301842996"/>
-      </p:ext>
-    </p:extLst>
-  </p:cSld>
-  <p:clrMapOvr>
-    <a:masterClrMapping/>
-  </p:clrMapOvr>
-  <p:timing>
-    <p:tnLst>
-      <p:par>
-        <p:cTn id="1" dur="indefinite" restart="never" nodeType="tmRoot"/>
-      </p:par>
-    </p:tnLst>
-  </p:timing>
-</p:sld>
-</file>
-
-<file path=ppt/slides/slide9.xml><?xml version="1.0" encoding="utf-8"?>
-<p:sld xmlns:a="http://schemas.openxmlformats.org/drawingml/2006/main" xmlns:r="http://schemas.openxmlformats.org/officeDocument/2006/relationships" xmlns:p="http://schemas.openxmlformats.org/presentationml/2006/main">
-  <p:cSld>
-    <p:spTree>
-      <p:nvGrpSpPr>
-        <p:cNvPr id="1" name=""/>
-        <p:cNvGrpSpPr/>
-        <p:nvPr/>
-      </p:nvGrpSpPr>
-      <p:grpSpPr>
-        <a:xfrm>
-          <a:off x="0" y="0"/>
-          <a:ext cx="0" cy="0"/>
-          <a:chOff x="0" y="0"/>
-          <a:chExt cx="0" cy="0"/>
-        </a:xfrm>
-      </p:grpSpPr>
-      <p:sp>
-        <p:nvSpPr>
-          <p:cNvPr id="2" name="Title 1"/>
-          <p:cNvSpPr>
-            <a:spLocks noGrp="1"/>
-          </p:cNvSpPr>
-          <p:nvPr>
-            <p:ph type="title"/>
-          </p:nvPr>
-        </p:nvSpPr>
-        <p:spPr/>
-        <p:txBody>
-          <a:bodyPr/>
-          <a:lstStyle/>
-          <a:p>
-            <a:r>
-              <a:rPr lang="en-US" smtClean="0"/>
-              <a:t>An </a:t>
-            </a:r>
-            <a:r>
-              <a:rPr lang="en-US" i="1" smtClean="0"/>
-              <a:t>event</a:t>
-            </a:r>
-            <a:r>
-              <a:rPr lang="en-US" smtClean="0"/>
-              <a:t> is a member</a:t>
-            </a:r>
-            <a:endParaRPr lang="en-US"/>
-          </a:p>
-        </p:txBody>
-      </p:sp>
-      <p:pic>
-        <p:nvPicPr>
-          <p:cNvPr id="6" name="Picture 5"/>
-          <p:cNvPicPr>
-            <a:picLocks noChangeAspect="1"/>
-          </p:cNvPicPr>
-          <p:nvPr/>
-        </p:nvPicPr>
-        <p:blipFill>
-          <a:blip r:embed="rId2"/>
-          <a:stretch>
-            <a:fillRect/>
-          </a:stretch>
-        </p:blipFill>
-        <p:spPr>
-          <a:xfrm>
-            <a:off x="1097279" y="1889871"/>
-            <a:ext cx="8129847" cy="4392429"/>
-          </a:xfrm>
-          <a:prstGeom prst="rect">
-            <a:avLst/>
-          </a:prstGeom>
-        </p:spPr>
-      </p:pic>
-    </p:spTree>
-    <p:extLst>
-      <p:ext uri="{BB962C8B-B14F-4D97-AF65-F5344CB8AC3E}">
-        <p14:creationId xmlns:p14="http://schemas.microsoft.com/office/powerpoint/2010/main" val="3836253029"/>
       </p:ext>
     </p:extLst>
   </p:cSld>

</xml_diff>

<commit_message>
Updated reference slide with newest blog posts
</commit_message>
<xml_diff>
--- a/ThinkingInEvents-UserGroupTalk.pptx
+++ b/ThinkingInEvents-UserGroupTalk.pptx
@@ -30,7 +30,7 @@
     <p:sldId id="408" r:id="rId21"/>
     <p:sldId id="516" r:id="rId22"/>
     <p:sldId id="576" r:id="rId23"/>
-    <p:sldId id="549" r:id="rId24"/>
+    <p:sldId id="579" r:id="rId24"/>
     <p:sldId id="574" r:id="rId25"/>
     <p:sldId id="572" r:id="rId26"/>
     <p:sldId id="573" r:id="rId27"/>
@@ -223,7 +223,7 @@
           <a:p>
             <a:fld id="{D8D04E9A-002C-48D9-9B8C-2D672EB0EF8E}" type="datetimeFigureOut">
               <a:rPr lang="en-US" smtClean="0"/>
-              <a:t>10/10/2015</a:t>
+              <a:t>10/13/2015</a:t>
             </a:fld>
             <a:endParaRPr lang="en-US"/>
           </a:p>
@@ -751,6 +751,90 @@
 </p:notes>
 </file>
 
+<file path=ppt/notesSlides/notesSlide4.xml><?xml version="1.0" encoding="utf-8"?>
+<p:notes xmlns:a="http://schemas.openxmlformats.org/drawingml/2006/main" xmlns:r="http://schemas.openxmlformats.org/officeDocument/2006/relationships" xmlns:p="http://schemas.openxmlformats.org/presentationml/2006/main">
+  <p:cSld>
+    <p:spTree>
+      <p:nvGrpSpPr>
+        <p:cNvPr id="1" name=""/>
+        <p:cNvGrpSpPr/>
+        <p:nvPr/>
+      </p:nvGrpSpPr>
+      <p:grpSpPr>
+        <a:xfrm>
+          <a:off x="0" y="0"/>
+          <a:ext cx="0" cy="0"/>
+          <a:chOff x="0" y="0"/>
+          <a:chExt cx="0" cy="0"/>
+        </a:xfrm>
+      </p:grpSpPr>
+      <p:sp>
+        <p:nvSpPr>
+          <p:cNvPr id="2" name="Slide Image Placeholder 1"/>
+          <p:cNvSpPr>
+            <a:spLocks noGrp="1" noRot="1" noChangeAspect="1"/>
+          </p:cNvSpPr>
+          <p:nvPr>
+            <p:ph type="sldImg"/>
+          </p:nvPr>
+        </p:nvSpPr>
+        <p:spPr/>
+      </p:sp>
+      <p:sp>
+        <p:nvSpPr>
+          <p:cNvPr id="3" name="Notes Placeholder 2"/>
+          <p:cNvSpPr>
+            <a:spLocks noGrp="1"/>
+          </p:cNvSpPr>
+          <p:nvPr>
+            <p:ph type="body" idx="1"/>
+          </p:nvPr>
+        </p:nvSpPr>
+        <p:spPr/>
+        <p:txBody>
+          <a:bodyPr/>
+          <a:lstStyle/>
+          <a:p>
+            <a:endParaRPr lang="en-US"/>
+          </a:p>
+        </p:txBody>
+      </p:sp>
+      <p:sp>
+        <p:nvSpPr>
+          <p:cNvPr id="4" name="Slide Number Placeholder 3"/>
+          <p:cNvSpPr>
+            <a:spLocks noGrp="1"/>
+          </p:cNvSpPr>
+          <p:nvPr>
+            <p:ph type="sldNum" sz="quarter" idx="10"/>
+          </p:nvPr>
+        </p:nvSpPr>
+        <p:spPr/>
+        <p:txBody>
+          <a:bodyPr/>
+          <a:lstStyle/>
+          <a:p>
+            <a:fld id="{1C4B0D22-0794-4A46-9999-BF90B47B1EAE}" type="slidenum">
+              <a:rPr lang="en-US" smtClean="0"/>
+              <a:t>23</a:t>
+            </a:fld>
+            <a:endParaRPr lang="en-US"/>
+          </a:p>
+        </p:txBody>
+      </p:sp>
+    </p:spTree>
+    <p:extLst>
+      <p:ext uri="{BB962C8B-B14F-4D97-AF65-F5344CB8AC3E}">
+        <p14:creationId xmlns:p14="http://schemas.microsoft.com/office/powerpoint/2010/main" val="2552538279"/>
+      </p:ext>
+    </p:extLst>
+  </p:cSld>
+  <p:clrMapOvr>
+    <a:masterClrMapping/>
+  </p:clrMapOvr>
+</p:notes>
+</file>
+
 <file path=ppt/slideLayouts/slideLayout1.xml><?xml version="1.0" encoding="utf-8"?>
 <p:sldLayout xmlns:a="http://schemas.openxmlformats.org/drawingml/2006/main" xmlns:r="http://schemas.openxmlformats.org/officeDocument/2006/relationships" xmlns:p="http://schemas.openxmlformats.org/presentationml/2006/main" showMasterSp="0" type="title" preserve="1">
   <p:cSld name="Title Slide">
@@ -977,7 +1061,7 @@
           <a:p>
             <a:fld id="{96DFF08F-DC6B-4601-B491-B0F83F6DD2DA}" type="datetimeFigureOut">
               <a:rPr lang="en-US" smtClean="0"/>
-              <a:t>10/10/2015</a:t>
+              <a:t>10/13/2015</a:t>
             </a:fld>
             <a:endParaRPr lang="en-US" dirty="0"/>
           </a:p>
@@ -1185,7 +1269,7 @@
           <a:p>
             <a:fld id="{96DFF08F-DC6B-4601-B491-B0F83F6DD2DA}" type="datetimeFigureOut">
               <a:rPr lang="en-US" smtClean="0"/>
-              <a:t>10/10/2015</a:t>
+              <a:t>10/13/2015</a:t>
             </a:fld>
             <a:endParaRPr lang="en-US" dirty="0"/>
           </a:p>
@@ -1441,7 +1525,7 @@
           <a:p>
             <a:fld id="{96DFF08F-DC6B-4601-B491-B0F83F6DD2DA}" type="datetimeFigureOut">
               <a:rPr lang="en-US" smtClean="0"/>
-              <a:t>10/10/2015</a:t>
+              <a:t>10/13/2015</a:t>
             </a:fld>
             <a:endParaRPr lang="en-US" dirty="0"/>
           </a:p>
@@ -1800,7 +1884,7 @@
           <a:p>
             <a:fld id="{D62CEF3B-A037-46D0-B02C-1428F07E9383}" type="datetimeFigureOut">
               <a:rPr lang="en-US" smtClean="0"/>
-              <a:t>10/10/2015</a:t>
+              <a:t>10/13/2015</a:t>
             </a:fld>
             <a:endParaRPr lang="en-US" dirty="0"/>
           </a:p>
@@ -2143,7 +2227,7 @@
           <a:p>
             <a:fld id="{96DFF08F-DC6B-4601-B491-B0F83F6DD2DA}" type="datetimeFigureOut">
               <a:rPr lang="en-US" smtClean="0"/>
-              <a:t>10/10/2015</a:t>
+              <a:t>10/13/2015</a:t>
             </a:fld>
             <a:endParaRPr lang="en-US" dirty="0"/>
           </a:p>
@@ -2418,7 +2502,7 @@
           <a:p>
             <a:fld id="{96DFF08F-DC6B-4601-B491-B0F83F6DD2DA}" type="datetimeFigureOut">
               <a:rPr lang="en-US" smtClean="0"/>
-              <a:t>10/10/2015</a:t>
+              <a:t>10/13/2015</a:t>
             </a:fld>
             <a:endParaRPr lang="en-US" dirty="0"/>
           </a:p>
@@ -2797,7 +2881,7 @@
           <a:p>
             <a:fld id="{96DFF08F-DC6B-4601-B491-B0F83F6DD2DA}" type="datetimeFigureOut">
               <a:rPr lang="en-US" smtClean="0"/>
-              <a:t>10/10/2015</a:t>
+              <a:t>10/13/2015</a:t>
             </a:fld>
             <a:endParaRPr lang="en-US" dirty="0"/>
           </a:p>
@@ -2915,7 +2999,7 @@
           <a:p>
             <a:fld id="{96DFF08F-DC6B-4601-B491-B0F83F6DD2DA}" type="datetimeFigureOut">
               <a:rPr lang="en-US" smtClean="0"/>
-              <a:t>10/10/2015</a:t>
+              <a:t>10/13/2015</a:t>
             </a:fld>
             <a:endParaRPr lang="en-US" dirty="0"/>
           </a:p>
@@ -3087,7 +3171,7 @@
             <a:fld id="{96DFF08F-DC6B-4601-B491-B0F83F6DD2DA}" type="datetimeFigureOut">
               <a:rPr lang="en-US" smtClean="0"/>
               <a:pPr/>
-              <a:t>10/10/2015</a:t>
+              <a:t>10/13/2015</a:t>
             </a:fld>
             <a:endParaRPr lang="en-US" dirty="0"/>
           </a:p>
@@ -3443,7 +3527,7 @@
             <a:fld id="{96DFF08F-DC6B-4601-B491-B0F83F6DD2DA}" type="datetimeFigureOut">
               <a:rPr lang="en-US" smtClean="0"/>
               <a:pPr/>
-              <a:t>10/10/2015</a:t>
+              <a:t>10/13/2015</a:t>
             </a:fld>
             <a:endParaRPr lang="en-US" dirty="0"/>
           </a:p>
@@ -3821,7 +3905,7 @@
           <a:p>
             <a:fld id="{96DFF08F-DC6B-4601-B491-B0F83F6DD2DA}" type="datetimeFigureOut">
               <a:rPr lang="en-US" smtClean="0"/>
-              <a:t>10/10/2015</a:t>
+              <a:t>10/13/2015</a:t>
             </a:fld>
             <a:endParaRPr lang="en-US" dirty="0"/>
           </a:p>
@@ -4109,7 +4193,7 @@
             <a:fld id="{96DFF08F-DC6B-4601-B491-B0F83F6DD2DA}" type="datetimeFigureOut">
               <a:rPr lang="en-US" smtClean="0"/>
               <a:pPr/>
-              <a:t>10/10/2015</a:t>
+              <a:t>10/13/2015</a:t>
             </a:fld>
             <a:endParaRPr lang="en-US" dirty="0"/>
           </a:p>
@@ -7861,7 +7945,7 @@
         <p:spPr>
           <a:xfrm>
             <a:off x="1210236" y="2088776"/>
-            <a:ext cx="9502588" cy="4001095"/>
+            <a:ext cx="9502588" cy="5109091"/>
           </a:xfrm>
           <a:prstGeom prst="rect">
             <a:avLst/>
@@ -7877,54 +7961,35 @@
             <a:r>
               <a:rPr lang="en-US" sz="2000" smtClean="0">
                 <a:solidFill>
-                  <a:schemeClr val="tx1">
-                    <a:lumMod val="65000"/>
-                    <a:lumOff val="35000"/>
-                  </a:schemeClr>
-                </a:solidFill>
-              </a:rPr>
-              <a:t>GUI Tutorials</a:t>
+                  <a:srgbClr val="002060"/>
+                </a:solidFill>
+              </a:rPr>
+              <a:t>GUI App Tutorials and Basics</a:t>
             </a:r>
           </a:p>
           <a:p>
             <a:pPr lvl="1"/>
             <a:r>
               <a:rPr lang="en-US" smtClean="0">
-                <a:hlinkClick r:id="rId2"/>
+                <a:hlinkClick r:id="rId3"/>
               </a:rPr>
               <a:t>Creating </a:t>
             </a:r>
-            <a:r>
-              <a:rPr lang="en-US">
-                <a:hlinkClick r:id="rId2"/>
-              </a:rPr>
-              <a:t>a Basic GUI</a:t>
-            </a:r>
-            <a:endParaRPr lang="en-US"/>
-          </a:p>
-          <a:p>
-            <a:pPr lvl="1"/>
             <a:r>
               <a:rPr lang="en-US">
                 <a:hlinkClick r:id="rId3"/>
               </a:rPr>
-              <a:t>Displaying Output in a GUI Application</a:t>
+              <a:t>a Basic GUI</a:t>
             </a:r>
             <a:endParaRPr lang="en-US"/>
           </a:p>
           <a:p>
             <a:pPr lvl="1"/>
-            <a:r>
-              <a:rPr lang="en-US" smtClean="0">
-                <a:hlinkClick r:id="rId4"/>
-              </a:rPr>
-              <a:t>Managing </a:t>
-            </a:r>
             <a:r>
               <a:rPr lang="en-US">
                 <a:hlinkClick r:id="rId4"/>
               </a:rPr>
-              <a:t>Errors in a GUI Application</a:t>
+              <a:t>Displaying Output in a GUI Application</a:t>
             </a:r>
             <a:endParaRPr lang="en-US"/>
           </a:p>
@@ -7934,12 +7999,15 @@
               <a:rPr lang="en-US" smtClean="0">
                 <a:hlinkClick r:id="rId5"/>
               </a:rPr>
-              <a:t>Understanding Streams, Redirection, and Write-Host</a:t>
-            </a:r>
-            <a:r>
-              <a:rPr lang="en-US" smtClean="0"/>
-              <a:t>  (update July 4, 2015)</a:t>
-            </a:r>
+              <a:t>Managing </a:t>
+            </a:r>
+            <a:r>
+              <a:rPr lang="en-US">
+                <a:hlinkClick r:id="rId5"/>
+              </a:rPr>
+              <a:t>Errors in a GUI Application</a:t>
+            </a:r>
+            <a:endParaRPr lang="en-US"/>
           </a:p>
           <a:p>
             <a:pPr lvl="1"/>
@@ -7947,6 +8015,19 @@
               <a:rPr lang="en-US" smtClean="0">
                 <a:hlinkClick r:id="rId6"/>
               </a:rPr>
+              <a:t>Understanding Streams, Redirection, and Write-Host</a:t>
+            </a:r>
+            <a:r>
+              <a:rPr lang="en-US" smtClean="0"/>
+              <a:t>  (update July 4, 2015)</a:t>
+            </a:r>
+          </a:p>
+          <a:p>
+            <a:pPr lvl="1"/>
+            <a:r>
+              <a:rPr lang="en-US" smtClean="0">
+                <a:hlinkClick r:id="rId7"/>
+              </a:rPr>
               <a:t>Passing and Returning Values Using Forms</a:t>
             </a:r>
             <a:endParaRPr lang="en-US"/>
@@ -7955,7 +8036,7 @@
             <a:pPr lvl="1"/>
             <a:r>
               <a:rPr lang="en-US">
-                <a:hlinkClick r:id="rId7" tooltip="Permanent Link: Creating a GUI for CSV Data"/>
+                <a:hlinkClick r:id="rId8" tooltip="Permanent Link: Creating a GUI for CSV Data"/>
               </a:rPr>
               <a:t>Creating a GUI for CSV Data</a:t>
             </a:r>
@@ -7965,7 +8046,7 @@
             <a:pPr lvl="1"/>
             <a:r>
               <a:rPr lang="en-US" smtClean="0">
-                <a:hlinkClick r:id="rId8" tooltip="Permanent Link to Adding auto-complete to an input textbox"/>
+                <a:hlinkClick r:id="rId9" tooltip="Permanent Link to Adding auto-complete to an input textbox"/>
               </a:rPr>
               <a:t>Adding Auto-Complete to an Input Textbox</a:t>
             </a:r>
@@ -7975,21 +8056,82 @@
             <a:pPr lvl="1"/>
             <a:r>
               <a:rPr lang="en-US">
-                <a:hlinkClick r:id="rId9" tooltip="Permanent Link to Copy to Clipboard in a GUI Application"/>
-              </a:rPr>
-              <a:t>Copy to Clipboard in a GUI Application</a:t>
+                <a:hlinkClick r:id="rId10" tooltip="Permanent Link to Copy to Clipboard in a GUI Application"/>
+              </a:rPr>
+              <a:t>Copy to Clipboard in a GUI </a:t>
+            </a:r>
+            <a:r>
+              <a:rPr lang="en-US" smtClean="0">
+                <a:hlinkClick r:id="rId10" tooltip="Permanent Link to Copy to Clipboard in a GUI Application"/>
+              </a:rPr>
+              <a:t>Application</a:t>
+            </a:r>
+            <a:r>
+              <a:rPr lang="en-US" smtClean="0"/>
+              <a:t/>
+            </a:r>
+            <a:br>
+              <a:rPr lang="en-US" smtClean="0"/>
+            </a:br>
+            <a:r>
+              <a:rPr lang="en-US" smtClean="0">
+                <a:hlinkClick r:id="rId11"/>
+              </a:rPr>
+              <a:t>Typing Enter Pushes a Button</a:t>
+            </a:r>
+            <a:r>
+              <a:rPr lang="en-US" smtClean="0"/>
+              <a:t/>
+            </a:r>
+            <a:br>
+              <a:rPr lang="en-US" smtClean="0"/>
+            </a:br>
+            <a:r>
+              <a:rPr lang="en-US" smtClean="0">
+                <a:hlinkClick r:id="rId12"/>
+              </a:rPr>
+              <a:t>Scope in a PowerShell GUI App</a:t>
+            </a:r>
+            <a:endParaRPr lang="en-US" smtClean="0"/>
+          </a:p>
+          <a:p>
+            <a:pPr lvl="1"/>
+            <a:r>
+              <a:rPr lang="en-US" smtClean="0">
+                <a:hlinkClick r:id="rId13"/>
+              </a:rPr>
+              <a:t>The Methods That Register Events</a:t>
+            </a:r>
+            <a:endParaRPr lang="en-US" smtClean="0"/>
+          </a:p>
+          <a:p>
+            <a:pPr lvl="1"/>
+            <a:r>
+              <a:rPr lang="en-US">
+                <a:hlinkClick r:id="rId14" tooltip="Permanent Link: PowerShell GUI Debugging Tip: Duplicate Event Handlers"/>
+              </a:rPr>
+              <a:t>PowerShell GUI Debugging Tip: Duplicate Event Handlers</a:t>
             </a:r>
             <a:endParaRPr lang="en-US"/>
           </a:p>
           <a:p>
+            <a:pPr lvl="1"/>
             <a:endParaRPr lang="en-US" smtClean="0"/>
           </a:p>
           <a:p>
             <a:r>
-              <a:rPr lang="en-US" smtClean="0"/>
+              <a:rPr lang="en-US" smtClean="0">
+                <a:solidFill>
+                  <a:srgbClr val="002060"/>
+                </a:solidFill>
+              </a:rPr>
               <a:t>About Face:  The Essentials of Interactive Design (Sept. 2014)</a:t>
             </a:r>
-            <a:endParaRPr lang="en-US"/>
+            <a:endParaRPr lang="en-US">
+              <a:solidFill>
+                <a:srgbClr val="002060"/>
+              </a:solidFill>
+            </a:endParaRPr>
           </a:p>
           <a:p>
             <a:endParaRPr lang="en-US" smtClean="0"/>
@@ -8005,7 +8147,7 @@
     </p:spTree>
     <p:extLst>
       <p:ext uri="{BB962C8B-B14F-4D97-AF65-F5344CB8AC3E}">
-        <p14:creationId xmlns:p14="http://schemas.microsoft.com/office/powerpoint/2010/main" val="3029466621"/>
+        <p14:creationId xmlns:p14="http://schemas.microsoft.com/office/powerpoint/2010/main" val="1154826808"/>
       </p:ext>
     </p:extLst>
   </p:cSld>

</xml_diff>